<commit_message>
replace old rss logo icon with new and round corner icon. clean words and format in slides 1-5.
</commit_message>
<xml_diff>
--- a/ProjectCS639.pptx
+++ b/ProjectCS639.pptx
@@ -4,6 +4,9 @@
   <p:sldMasterIdLst>
     <p:sldMasterId id="2147483696" r:id="rId1"/>
   </p:sldMasterIdLst>
+  <p:notesMasterIdLst>
+    <p:notesMasterId r:id="rId18"/>
+  </p:notesMasterIdLst>
   <p:sldIdLst>
     <p:sldId id="256" r:id="rId2"/>
     <p:sldId id="257" r:id="rId3"/>
@@ -4334,7 +4337,29 @@
         <a:p>
           <a:r>
             <a:rPr lang="en-US" dirty="0" smtClean="0"/>
-            <a:t>RSS (Rich Site Summary); originally RDF Site Summary; often called Really Simple Syndication, uses a family of standard web feed formats</a:t>
+            <a:t>RSS (Rich Site Summary</a:t>
+          </a:r>
+          <a:r>
+            <a:rPr lang="en-US" dirty="0" smtClean="0"/>
+            <a:t>), </a:t>
+          </a:r>
+          <a:r>
+            <a:rPr lang="en-US" dirty="0" smtClean="0"/>
+            <a:t>often called Really Simple </a:t>
+          </a:r>
+          <a:r>
+            <a:rPr lang="en-US" dirty="0" smtClean="0"/>
+            <a:t>Syndication</a:t>
+          </a:r>
+        </a:p>
+        <a:p>
+          <a:r>
+            <a:rPr lang="en-US" dirty="0" smtClean="0"/>
+            <a:t>Uses </a:t>
+          </a:r>
+          <a:r>
+            <a:rPr lang="en-US" dirty="0" smtClean="0"/>
+            <a:t>a family of standard web feed formats</a:t>
           </a:r>
           <a:endParaRPr lang="en-US" dirty="0"/>
         </a:p>
@@ -4371,7 +4396,19 @@
         <a:p>
           <a:r>
             <a:rPr lang="en-US" dirty="0" smtClean="0"/>
-            <a:t>Create a personal news feed and read your favorite websites and blogs in a clean and intuitive format. </a:t>
+            <a:t>Create a personal news feed and read </a:t>
+          </a:r>
+          <a:r>
+            <a:rPr lang="en-US" dirty="0" smtClean="0"/>
+            <a:t>websites in </a:t>
+          </a:r>
+          <a:r>
+            <a:rPr lang="en-US" dirty="0" smtClean="0"/>
+            <a:t>a clean and intuitive </a:t>
+          </a:r>
+          <a:r>
+            <a:rPr lang="en-US" dirty="0" smtClean="0"/>
+            <a:t>format</a:t>
           </a:r>
           <a:endParaRPr lang="en-US" dirty="0"/>
         </a:p>
@@ -4408,7 +4445,31 @@
         <a:p>
           <a:r>
             <a:rPr lang="en-US" dirty="0" smtClean="0"/>
-            <a:t>Subscribe to as many feeds as you want and keep up on all topics and sources you care about.	</a:t>
+            <a:t>Subscribe </a:t>
+          </a:r>
+          <a:r>
+            <a:rPr lang="en-US" dirty="0" smtClean="0"/>
+            <a:t>many </a:t>
+          </a:r>
+          <a:r>
+            <a:rPr lang="en-US" dirty="0" smtClean="0"/>
+            <a:t>feeds </a:t>
+          </a:r>
+          <a:r>
+            <a:rPr lang="en-US" dirty="0" smtClean="0"/>
+            <a:t>and </a:t>
+          </a:r>
+          <a:r>
+            <a:rPr lang="en-US" dirty="0" smtClean="0"/>
+            <a:t>keep </a:t>
+          </a:r>
+          <a:r>
+            <a:rPr lang="en-US" dirty="0" smtClean="0"/>
+            <a:t>updates with the sources</a:t>
+          </a:r>
+          <a:r>
+            <a:rPr lang="en-US" dirty="0" smtClean="0"/>
+            <a:t>	</a:t>
           </a:r>
           <a:endParaRPr lang="en-US" dirty="0"/>
         </a:p>
@@ -5631,19 +5692,19 @@
     </dgm:pt>
   </dgm:ptLst>
   <dgm:cxnLst>
+    <dgm:cxn modelId="{3EDC4C70-B80B-448D-83B3-83C2D631D441}" srcId="{88EF9924-716E-42E9-AB64-687B0D5F0E27}" destId="{5A3F655D-86D8-4CAD-A1BB-72CF833D7F2C}" srcOrd="2" destOrd="0" parTransId="{B99E623B-9B6F-4BE0-A08F-4E417DDEF87E}" sibTransId="{E58A5292-0E8D-4134-81CD-492CBA8C8AC4}"/>
+    <dgm:cxn modelId="{F1534FD1-1A31-4970-B41A-D52E69207035}" type="presOf" srcId="{5A3F655D-86D8-4CAD-A1BB-72CF833D7F2C}" destId="{13831478-F23F-4100-A7E7-DE06624862DD}" srcOrd="0" destOrd="0" presId="urn:microsoft.com/office/officeart/2005/8/layout/hList6"/>
+    <dgm:cxn modelId="{68FAED8C-6741-4353-AA0A-F3D25919AD33}" srcId="{88EF9924-716E-42E9-AB64-687B0D5F0E27}" destId="{31DFA831-79CF-43D4-92BE-043E5D1306FD}" srcOrd="0" destOrd="0" parTransId="{751DE861-30E9-413B-B750-4FCEF6CAEDD4}" sibTransId="{B2D062BE-BB05-4733-8C3F-10C333BFFCD8}"/>
+    <dgm:cxn modelId="{9ACD5AD3-AA0A-44E3-9F01-4779FB2212DC}" srcId="{88EF9924-716E-42E9-AB64-687B0D5F0E27}" destId="{EF20D36D-B52E-4CF1-971B-8898885FF5E8}" srcOrd="5" destOrd="0" parTransId="{F5823B95-3220-40EB-9DEB-26C374075715}" sibTransId="{E4FDB41E-761F-4CFC-A81B-8F237A38A65B}"/>
     <dgm:cxn modelId="{EC2B3477-C13E-4D10-8987-0AA6FFD4E9B6}" type="presOf" srcId="{9A9D5A0B-5696-4692-A878-6377F4B48E0F}" destId="{61058727-6B8E-41F1-9631-03B859BE9760}" srcOrd="0" destOrd="0" presId="urn:microsoft.com/office/officeart/2005/8/layout/hList6"/>
+    <dgm:cxn modelId="{184A5F98-C996-452A-992D-5F4B6CA57C0A}" type="presOf" srcId="{408B3C1A-0D12-4C63-A2E7-15D8F4FCEBA0}" destId="{B4CAADBC-3A4C-43AC-BC0E-C0C2F47C8D8F}" srcOrd="0" destOrd="0" presId="urn:microsoft.com/office/officeart/2005/8/layout/hList6"/>
     <dgm:cxn modelId="{7DE7B21F-07B7-4CEE-B70F-380C343C635D}" srcId="{88EF9924-716E-42E9-AB64-687B0D5F0E27}" destId="{408B3C1A-0D12-4C63-A2E7-15D8F4FCEBA0}" srcOrd="3" destOrd="0" parTransId="{78562F05-CE75-4676-84ED-F0D7EFB7FD63}" sibTransId="{863B1D93-9C21-4B9F-B33E-63325EAFE734}"/>
+    <dgm:cxn modelId="{007171E9-1D23-4447-9478-BB66E7BC6C30}" type="presOf" srcId="{88EF9924-716E-42E9-AB64-687B0D5F0E27}" destId="{692B4974-C617-434A-8776-2F70C6503C51}" srcOrd="0" destOrd="0" presId="urn:microsoft.com/office/officeart/2005/8/layout/hList6"/>
+    <dgm:cxn modelId="{72F9427B-E606-47DC-9C91-E47DD01A7F85}" type="presOf" srcId="{EF20D36D-B52E-4CF1-971B-8898885FF5E8}" destId="{A96E5A5A-E01C-4047-A91D-2A19F32207CC}" srcOrd="0" destOrd="0" presId="urn:microsoft.com/office/officeart/2005/8/layout/hList6"/>
     <dgm:cxn modelId="{4D665D7E-E5AD-4023-9ADA-B48181648234}" type="presOf" srcId="{31DFA831-79CF-43D4-92BE-043E5D1306FD}" destId="{13EE3AD0-0002-4DDD-81A1-35E0F1E19713}" srcOrd="0" destOrd="0" presId="urn:microsoft.com/office/officeart/2005/8/layout/hList6"/>
+    <dgm:cxn modelId="{DA67F082-ADA9-47C1-901A-FEBFA87C4ADC}" srcId="{88EF9924-716E-42E9-AB64-687B0D5F0E27}" destId="{FC47F4CD-37E3-4A69-8C8E-6FED298031AB}" srcOrd="1" destOrd="0" parTransId="{74C6D44E-3C2D-4CC3-A480-760268813022}" sibTransId="{61CF9D07-01F8-48C7-9E28-D9EC59EBE1D5}"/>
     <dgm:cxn modelId="{EC267472-C5C5-4FBE-9AEC-398D3CA18A7E}" type="presOf" srcId="{FC47F4CD-37E3-4A69-8C8E-6FED298031AB}" destId="{3D9FB879-71A3-4867-8E84-F0A4F3CC1359}" srcOrd="0" destOrd="0" presId="urn:microsoft.com/office/officeart/2005/8/layout/hList6"/>
-    <dgm:cxn modelId="{F1534FD1-1A31-4970-B41A-D52E69207035}" type="presOf" srcId="{5A3F655D-86D8-4CAD-A1BB-72CF833D7F2C}" destId="{13831478-F23F-4100-A7E7-DE06624862DD}" srcOrd="0" destOrd="0" presId="urn:microsoft.com/office/officeart/2005/8/layout/hList6"/>
-    <dgm:cxn modelId="{DA67F082-ADA9-47C1-901A-FEBFA87C4ADC}" srcId="{88EF9924-716E-42E9-AB64-687B0D5F0E27}" destId="{FC47F4CD-37E3-4A69-8C8E-6FED298031AB}" srcOrd="1" destOrd="0" parTransId="{74C6D44E-3C2D-4CC3-A480-760268813022}" sibTransId="{61CF9D07-01F8-48C7-9E28-D9EC59EBE1D5}"/>
-    <dgm:cxn modelId="{72F9427B-E606-47DC-9C91-E47DD01A7F85}" type="presOf" srcId="{EF20D36D-B52E-4CF1-971B-8898885FF5E8}" destId="{A96E5A5A-E01C-4047-A91D-2A19F32207CC}" srcOrd="0" destOrd="0" presId="urn:microsoft.com/office/officeart/2005/8/layout/hList6"/>
-    <dgm:cxn modelId="{3EDC4C70-B80B-448D-83B3-83C2D631D441}" srcId="{88EF9924-716E-42E9-AB64-687B0D5F0E27}" destId="{5A3F655D-86D8-4CAD-A1BB-72CF833D7F2C}" srcOrd="2" destOrd="0" parTransId="{B99E623B-9B6F-4BE0-A08F-4E417DDEF87E}" sibTransId="{E58A5292-0E8D-4134-81CD-492CBA8C8AC4}"/>
     <dgm:cxn modelId="{814F0F62-1339-4920-B36B-323AD6046FA2}" srcId="{88EF9924-716E-42E9-AB64-687B0D5F0E27}" destId="{9A9D5A0B-5696-4692-A878-6377F4B48E0F}" srcOrd="4" destOrd="0" parTransId="{022FA54A-605C-43C6-AA65-F23AD18215C2}" sibTransId="{238B5600-741D-458F-810B-5A71A32345B9}"/>
-    <dgm:cxn modelId="{184A5F98-C996-452A-992D-5F4B6CA57C0A}" type="presOf" srcId="{408B3C1A-0D12-4C63-A2E7-15D8F4FCEBA0}" destId="{B4CAADBC-3A4C-43AC-BC0E-C0C2F47C8D8F}" srcOrd="0" destOrd="0" presId="urn:microsoft.com/office/officeart/2005/8/layout/hList6"/>
-    <dgm:cxn modelId="{9ACD5AD3-AA0A-44E3-9F01-4779FB2212DC}" srcId="{88EF9924-716E-42E9-AB64-687B0D5F0E27}" destId="{EF20D36D-B52E-4CF1-971B-8898885FF5E8}" srcOrd="5" destOrd="0" parTransId="{F5823B95-3220-40EB-9DEB-26C374075715}" sibTransId="{E4FDB41E-761F-4CFC-A81B-8F237A38A65B}"/>
-    <dgm:cxn modelId="{007171E9-1D23-4447-9478-BB66E7BC6C30}" type="presOf" srcId="{88EF9924-716E-42E9-AB64-687B0D5F0E27}" destId="{692B4974-C617-434A-8776-2F70C6503C51}" srcOrd="0" destOrd="0" presId="urn:microsoft.com/office/officeart/2005/8/layout/hList6"/>
-    <dgm:cxn modelId="{68FAED8C-6741-4353-AA0A-F3D25919AD33}" srcId="{88EF9924-716E-42E9-AB64-687B0D5F0E27}" destId="{31DFA831-79CF-43D4-92BE-043E5D1306FD}" srcOrd="0" destOrd="0" parTransId="{751DE861-30E9-413B-B750-4FCEF6CAEDD4}" sibTransId="{B2D062BE-BB05-4733-8C3F-10C333BFFCD8}"/>
     <dgm:cxn modelId="{CE631BB9-76E1-4147-8C3C-78C27834A0F6}" type="presParOf" srcId="{692B4974-C617-434A-8776-2F70C6503C51}" destId="{13EE3AD0-0002-4DDD-81A1-35E0F1E19713}" srcOrd="0" destOrd="0" presId="urn:microsoft.com/office/officeart/2005/8/layout/hList6"/>
     <dgm:cxn modelId="{702017B9-54FA-475D-A612-1B204F42DD07}" type="presParOf" srcId="{692B4974-C617-434A-8776-2F70C6503C51}" destId="{C48B6298-C863-4E87-8FA4-0913B94604A3}" srcOrd="1" destOrd="0" presId="urn:microsoft.com/office/officeart/2005/8/layout/hList6"/>
     <dgm:cxn modelId="{F9E0157A-07E4-4383-914E-1FEA355CEF97}" type="presParOf" srcId="{692B4974-C617-434A-8776-2F70C6503C51}" destId="{3D9FB879-71A3-4867-8E84-F0A4F3CC1359}" srcOrd="2" destOrd="0" presId="urn:microsoft.com/office/officeart/2005/8/layout/hList6"/>
@@ -6026,12 +6087,12 @@
         </a:fontRef>
       </dsp:style>
       <dsp:txBody>
-        <a:bodyPr spcFirstLastPara="0" vert="horz" wrap="square" lIns="860213" tIns="63500" rIns="63500" bIns="63500" numCol="1" spcCol="1270" anchor="ctr" anchorCtr="0">
+        <a:bodyPr spcFirstLastPara="0" vert="horz" wrap="square" lIns="860213" tIns="60960" rIns="60960" bIns="60960" numCol="1" spcCol="1270" anchor="ctr" anchorCtr="0">
           <a:noAutofit/>
         </a:bodyPr>
         <a:lstStyle/>
         <a:p>
-          <a:pPr lvl="0" algn="l" defTabSz="1111250">
+          <a:pPr lvl="0" algn="l" defTabSz="1066800">
             <a:lnSpc>
               <a:spcPct val="90000"/>
             </a:lnSpc>
@@ -6043,10 +6104,43 @@
             </a:spcAft>
           </a:pPr>
           <a:r>
-            <a:rPr lang="en-US" sz="2500" kern="1200" dirty="0" smtClean="0"/>
-            <a:t>RSS (Rich Site Summary); originally RDF Site Summary; often called Really Simple Syndication, uses a family of standard web feed formats</a:t>
+            <a:rPr lang="en-US" sz="2400" kern="1200" dirty="0" smtClean="0"/>
+            <a:t>RSS (Rich Site Summary</a:t>
           </a:r>
-          <a:endParaRPr lang="en-US" sz="2500" kern="1200" dirty="0"/>
+          <a:r>
+            <a:rPr lang="en-US" sz="2400" kern="1200" dirty="0" smtClean="0"/>
+            <a:t>), </a:t>
+          </a:r>
+          <a:r>
+            <a:rPr lang="en-US" sz="2400" kern="1200" dirty="0" smtClean="0"/>
+            <a:t>often called Really Simple </a:t>
+          </a:r>
+          <a:r>
+            <a:rPr lang="en-US" sz="2400" kern="1200" dirty="0" smtClean="0"/>
+            <a:t>Syndication</a:t>
+          </a:r>
+        </a:p>
+        <a:p>
+          <a:pPr lvl="0" algn="l" defTabSz="1066800">
+            <a:lnSpc>
+              <a:spcPct val="90000"/>
+            </a:lnSpc>
+            <a:spcBef>
+              <a:spcPct val="0"/>
+            </a:spcBef>
+            <a:spcAft>
+              <a:spcPct val="35000"/>
+            </a:spcAft>
+          </a:pPr>
+          <a:r>
+            <a:rPr lang="en-US" sz="2400" kern="1200" dirty="0" smtClean="0"/>
+            <a:t>Uses </a:t>
+          </a:r>
+          <a:r>
+            <a:rPr lang="en-US" sz="2400" kern="1200" dirty="0" smtClean="0"/>
+            <a:t>a family of standard web feed formats</a:t>
+          </a:r>
+          <a:endParaRPr lang="en-US" sz="2400" kern="1200" dirty="0"/>
         </a:p>
       </dsp:txBody>
       <dsp:txXfrm>
@@ -6150,12 +6244,12 @@
         </a:fontRef>
       </dsp:style>
       <dsp:txBody>
-        <a:bodyPr spcFirstLastPara="0" vert="horz" wrap="square" lIns="860213" tIns="63500" rIns="63500" bIns="63500" numCol="1" spcCol="1270" anchor="ctr" anchorCtr="0">
+        <a:bodyPr spcFirstLastPara="0" vert="horz" wrap="square" lIns="860213" tIns="60960" rIns="60960" bIns="60960" numCol="1" spcCol="1270" anchor="ctr" anchorCtr="0">
           <a:noAutofit/>
         </a:bodyPr>
         <a:lstStyle/>
         <a:p>
-          <a:pPr lvl="0" algn="l" defTabSz="1111250">
+          <a:pPr lvl="0" algn="l" defTabSz="1066800">
             <a:lnSpc>
               <a:spcPct val="90000"/>
             </a:lnSpc>
@@ -6167,10 +6261,22 @@
             </a:spcAft>
           </a:pPr>
           <a:r>
-            <a:rPr lang="en-US" sz="2500" kern="1200" dirty="0" smtClean="0"/>
-            <a:t>Create a personal news feed and read your favorite websites and blogs in a clean and intuitive format. </a:t>
+            <a:rPr lang="en-US" sz="2400" kern="1200" dirty="0" smtClean="0"/>
+            <a:t>Create a personal news feed and read </a:t>
           </a:r>
-          <a:endParaRPr lang="en-US" sz="2500" kern="1200" dirty="0"/>
+          <a:r>
+            <a:rPr lang="en-US" sz="2400" kern="1200" dirty="0" smtClean="0"/>
+            <a:t>websites in </a:t>
+          </a:r>
+          <a:r>
+            <a:rPr lang="en-US" sz="2400" kern="1200" dirty="0" smtClean="0"/>
+            <a:t>a clean and intuitive </a:t>
+          </a:r>
+          <a:r>
+            <a:rPr lang="en-US" sz="2400" kern="1200" dirty="0" smtClean="0"/>
+            <a:t>format</a:t>
+          </a:r>
+          <a:endParaRPr lang="en-US" sz="2400" kern="1200" dirty="0"/>
         </a:p>
       </dsp:txBody>
       <dsp:txXfrm>
@@ -6274,12 +6380,12 @@
         </a:fontRef>
       </dsp:style>
       <dsp:txBody>
-        <a:bodyPr spcFirstLastPara="0" vert="horz" wrap="square" lIns="860213" tIns="63500" rIns="63500" bIns="63500" numCol="1" spcCol="1270" anchor="ctr" anchorCtr="0">
+        <a:bodyPr spcFirstLastPara="0" vert="horz" wrap="square" lIns="860213" tIns="60960" rIns="60960" bIns="60960" numCol="1" spcCol="1270" anchor="ctr" anchorCtr="0">
           <a:noAutofit/>
         </a:bodyPr>
         <a:lstStyle/>
         <a:p>
-          <a:pPr lvl="0" algn="l" defTabSz="1111250">
+          <a:pPr lvl="0" algn="l" defTabSz="1066800">
             <a:lnSpc>
               <a:spcPct val="90000"/>
             </a:lnSpc>
@@ -6291,10 +6397,34 @@
             </a:spcAft>
           </a:pPr>
           <a:r>
-            <a:rPr lang="en-US" sz="2500" kern="1200" dirty="0" smtClean="0"/>
-            <a:t>Subscribe to as many feeds as you want and keep up on all topics and sources you care about.	</a:t>
+            <a:rPr lang="en-US" sz="2400" kern="1200" dirty="0" smtClean="0"/>
+            <a:t>Subscribe </a:t>
           </a:r>
-          <a:endParaRPr lang="en-US" sz="2500" kern="1200" dirty="0"/>
+          <a:r>
+            <a:rPr lang="en-US" sz="2400" kern="1200" dirty="0" smtClean="0"/>
+            <a:t>many </a:t>
+          </a:r>
+          <a:r>
+            <a:rPr lang="en-US" sz="2400" kern="1200" dirty="0" smtClean="0"/>
+            <a:t>feeds </a:t>
+          </a:r>
+          <a:r>
+            <a:rPr lang="en-US" sz="2400" kern="1200" dirty="0" smtClean="0"/>
+            <a:t>and </a:t>
+          </a:r>
+          <a:r>
+            <a:rPr lang="en-US" sz="2400" kern="1200" dirty="0" smtClean="0"/>
+            <a:t>keep </a:t>
+          </a:r>
+          <a:r>
+            <a:rPr lang="en-US" sz="2400" kern="1200" dirty="0" smtClean="0"/>
+            <a:t>updates with the sources</a:t>
+          </a:r>
+          <a:r>
+            <a:rPr lang="en-US" sz="2400" kern="1200" dirty="0" smtClean="0"/>
+            <a:t>	</a:t>
+          </a:r>
+          <a:endParaRPr lang="en-US" sz="2400" kern="1200" dirty="0"/>
         </a:p>
       </dsp:txBody>
       <dsp:txXfrm>
@@ -15091,6 +15221,463 @@
 </dgm:styleDef>
 </file>
 
+<file path=ppt/notesMasters/notesMaster1.xml><?xml version="1.0" encoding="utf-8"?>
+<p:notesMaster xmlns:a="http://schemas.openxmlformats.org/drawingml/2006/main" xmlns:r="http://schemas.openxmlformats.org/officeDocument/2006/relationships" xmlns:p="http://schemas.openxmlformats.org/presentationml/2006/main">
+  <p:cSld>
+    <p:bg>
+      <p:bgRef idx="1001">
+        <a:schemeClr val="bg1"/>
+      </p:bgRef>
+    </p:bg>
+    <p:spTree>
+      <p:nvGrpSpPr>
+        <p:cNvPr id="1" name=""/>
+        <p:cNvGrpSpPr/>
+        <p:nvPr/>
+      </p:nvGrpSpPr>
+      <p:grpSpPr>
+        <a:xfrm>
+          <a:off x="0" y="0"/>
+          <a:ext cx="0" cy="0"/>
+          <a:chOff x="0" y="0"/>
+          <a:chExt cx="0" cy="0"/>
+        </a:xfrm>
+      </p:grpSpPr>
+      <p:sp>
+        <p:nvSpPr>
+          <p:cNvPr id="2" name="Header Placeholder 1"/>
+          <p:cNvSpPr>
+            <a:spLocks noGrp="1"/>
+          </p:cNvSpPr>
+          <p:nvPr>
+            <p:ph type="hdr" sz="quarter"/>
+          </p:nvPr>
+        </p:nvSpPr>
+        <p:spPr>
+          <a:xfrm>
+            <a:off x="0" y="0"/>
+            <a:ext cx="2971800" cy="458788"/>
+          </a:xfrm>
+          <a:prstGeom prst="rect">
+            <a:avLst/>
+          </a:prstGeom>
+        </p:spPr>
+        <p:txBody>
+          <a:bodyPr vert="horz" lIns="91440" tIns="45720" rIns="91440" bIns="45720" rtlCol="0"/>
+          <a:lstStyle>
+            <a:lvl1pPr algn="l">
+              <a:defRPr sz="1200"/>
+            </a:lvl1pPr>
+          </a:lstStyle>
+          <a:p>
+            <a:endParaRPr lang="en-US"/>
+          </a:p>
+        </p:txBody>
+      </p:sp>
+      <p:sp>
+        <p:nvSpPr>
+          <p:cNvPr id="3" name="Date Placeholder 2"/>
+          <p:cNvSpPr>
+            <a:spLocks noGrp="1"/>
+          </p:cNvSpPr>
+          <p:nvPr>
+            <p:ph type="dt" idx="1"/>
+          </p:nvPr>
+        </p:nvSpPr>
+        <p:spPr>
+          <a:xfrm>
+            <a:off x="3884613" y="0"/>
+            <a:ext cx="2971800" cy="458788"/>
+          </a:xfrm>
+          <a:prstGeom prst="rect">
+            <a:avLst/>
+          </a:prstGeom>
+        </p:spPr>
+        <p:txBody>
+          <a:bodyPr vert="horz" lIns="91440" tIns="45720" rIns="91440" bIns="45720" rtlCol="0"/>
+          <a:lstStyle>
+            <a:lvl1pPr algn="r">
+              <a:defRPr sz="1200"/>
+            </a:lvl1pPr>
+          </a:lstStyle>
+          <a:p>
+            <a:fld id="{471EC18A-EB51-7247-A4D8-2F7029DD76D9}" type="datetimeFigureOut">
+              <a:rPr lang="en-US" smtClean="0"/>
+              <a:t>7/2/15</a:t>
+            </a:fld>
+            <a:endParaRPr lang="en-US"/>
+          </a:p>
+        </p:txBody>
+      </p:sp>
+      <p:sp>
+        <p:nvSpPr>
+          <p:cNvPr id="4" name="Slide Image Placeholder 3"/>
+          <p:cNvSpPr>
+            <a:spLocks noGrp="1" noRot="1" noChangeAspect="1"/>
+          </p:cNvSpPr>
+          <p:nvPr>
+            <p:ph type="sldImg" idx="2"/>
+          </p:nvPr>
+        </p:nvSpPr>
+        <p:spPr>
+          <a:xfrm>
+            <a:off x="685800" y="1143000"/>
+            <a:ext cx="5486400" cy="3086100"/>
+          </a:xfrm>
+          <a:prstGeom prst="rect">
+            <a:avLst/>
+          </a:prstGeom>
+          <a:noFill/>
+          <a:ln w="12700">
+            <a:solidFill>
+              <a:prstClr val="black"/>
+            </a:solidFill>
+          </a:ln>
+        </p:spPr>
+        <p:txBody>
+          <a:bodyPr vert="horz" lIns="91440" tIns="45720" rIns="91440" bIns="45720" rtlCol="0" anchor="ctr"/>
+          <a:lstStyle/>
+          <a:p>
+            <a:endParaRPr lang="en-US"/>
+          </a:p>
+        </p:txBody>
+      </p:sp>
+      <p:sp>
+        <p:nvSpPr>
+          <p:cNvPr id="5" name="Notes Placeholder 4"/>
+          <p:cNvSpPr>
+            <a:spLocks noGrp="1"/>
+          </p:cNvSpPr>
+          <p:nvPr>
+            <p:ph type="body" sz="quarter" idx="3"/>
+          </p:nvPr>
+        </p:nvSpPr>
+        <p:spPr>
+          <a:xfrm>
+            <a:off x="685800" y="4400550"/>
+            <a:ext cx="5486400" cy="3600450"/>
+          </a:xfrm>
+          <a:prstGeom prst="rect">
+            <a:avLst/>
+          </a:prstGeom>
+        </p:spPr>
+        <p:txBody>
+          <a:bodyPr vert="horz" lIns="91440" tIns="45720" rIns="91440" bIns="45720" rtlCol="0"/>
+          <a:lstStyle/>
+          <a:p>
+            <a:pPr lvl="0"/>
+            <a:r>
+              <a:rPr lang="en-US" smtClean="0"/>
+              <a:t>Click to edit Master text styles</a:t>
+            </a:r>
+          </a:p>
+          <a:p>
+            <a:pPr lvl="1"/>
+            <a:r>
+              <a:rPr lang="en-US" smtClean="0"/>
+              <a:t>Second level</a:t>
+            </a:r>
+          </a:p>
+          <a:p>
+            <a:pPr lvl="2"/>
+            <a:r>
+              <a:rPr lang="en-US" smtClean="0"/>
+              <a:t>Third level</a:t>
+            </a:r>
+          </a:p>
+          <a:p>
+            <a:pPr lvl="3"/>
+            <a:r>
+              <a:rPr lang="en-US" smtClean="0"/>
+              <a:t>Fourth level</a:t>
+            </a:r>
+          </a:p>
+          <a:p>
+            <a:pPr lvl="4"/>
+            <a:r>
+              <a:rPr lang="en-US" smtClean="0"/>
+              <a:t>Fifth level</a:t>
+            </a:r>
+            <a:endParaRPr lang="en-US"/>
+          </a:p>
+        </p:txBody>
+      </p:sp>
+      <p:sp>
+        <p:nvSpPr>
+          <p:cNvPr id="6" name="Footer Placeholder 5"/>
+          <p:cNvSpPr>
+            <a:spLocks noGrp="1"/>
+          </p:cNvSpPr>
+          <p:nvPr>
+            <p:ph type="ftr" sz="quarter" idx="4"/>
+          </p:nvPr>
+        </p:nvSpPr>
+        <p:spPr>
+          <a:xfrm>
+            <a:off x="0" y="8685213"/>
+            <a:ext cx="2971800" cy="458787"/>
+          </a:xfrm>
+          <a:prstGeom prst="rect">
+            <a:avLst/>
+          </a:prstGeom>
+        </p:spPr>
+        <p:txBody>
+          <a:bodyPr vert="horz" lIns="91440" tIns="45720" rIns="91440" bIns="45720" rtlCol="0" anchor="b"/>
+          <a:lstStyle>
+            <a:lvl1pPr algn="l">
+              <a:defRPr sz="1200"/>
+            </a:lvl1pPr>
+          </a:lstStyle>
+          <a:p>
+            <a:endParaRPr lang="en-US"/>
+          </a:p>
+        </p:txBody>
+      </p:sp>
+      <p:sp>
+        <p:nvSpPr>
+          <p:cNvPr id="7" name="Slide Number Placeholder 6"/>
+          <p:cNvSpPr>
+            <a:spLocks noGrp="1"/>
+          </p:cNvSpPr>
+          <p:nvPr>
+            <p:ph type="sldNum" sz="quarter" idx="5"/>
+          </p:nvPr>
+        </p:nvSpPr>
+        <p:spPr>
+          <a:xfrm>
+            <a:off x="3884613" y="8685213"/>
+            <a:ext cx="2971800" cy="458787"/>
+          </a:xfrm>
+          <a:prstGeom prst="rect">
+            <a:avLst/>
+          </a:prstGeom>
+        </p:spPr>
+        <p:txBody>
+          <a:bodyPr vert="horz" lIns="91440" tIns="45720" rIns="91440" bIns="45720" rtlCol="0" anchor="b"/>
+          <a:lstStyle>
+            <a:lvl1pPr algn="r">
+              <a:defRPr sz="1200"/>
+            </a:lvl1pPr>
+          </a:lstStyle>
+          <a:p>
+            <a:fld id="{B1FA3DE5-F376-5C43-8067-372A6F277606}" type="slidenum">
+              <a:rPr lang="en-US" smtClean="0"/>
+              <a:t>‹#›</a:t>
+            </a:fld>
+            <a:endParaRPr lang="en-US"/>
+          </a:p>
+        </p:txBody>
+      </p:sp>
+    </p:spTree>
+    <p:extLst>
+      <p:ext uri="{BB962C8B-B14F-4D97-AF65-F5344CB8AC3E}">
+        <p14:creationId xmlns:p14="http://schemas.microsoft.com/office/powerpoint/2010/main" val="1782436840"/>
+      </p:ext>
+    </p:extLst>
+  </p:cSld>
+  <p:clrMap bg1="lt1" tx1="dk1" bg2="lt2" tx2="dk2" accent1="accent1" accent2="accent2" accent3="accent3" accent4="accent4" accent5="accent5" accent6="accent6" hlink="hlink" folHlink="folHlink"/>
+  <p:notesStyle>
+    <a:lvl1pPr marL="0" algn="l" defTabSz="914400" rtl="0" eaLnBrk="1" latinLnBrk="0" hangingPunct="1">
+      <a:defRPr sz="1200" kern="1200">
+        <a:solidFill>
+          <a:schemeClr val="tx1"/>
+        </a:solidFill>
+        <a:latin typeface="+mn-lt"/>
+        <a:ea typeface="+mn-ea"/>
+        <a:cs typeface="+mn-cs"/>
+      </a:defRPr>
+    </a:lvl1pPr>
+    <a:lvl2pPr marL="457200" algn="l" defTabSz="914400" rtl="0" eaLnBrk="1" latinLnBrk="0" hangingPunct="1">
+      <a:defRPr sz="1200" kern="1200">
+        <a:solidFill>
+          <a:schemeClr val="tx1"/>
+        </a:solidFill>
+        <a:latin typeface="+mn-lt"/>
+        <a:ea typeface="+mn-ea"/>
+        <a:cs typeface="+mn-cs"/>
+      </a:defRPr>
+    </a:lvl2pPr>
+    <a:lvl3pPr marL="914400" algn="l" defTabSz="914400" rtl="0" eaLnBrk="1" latinLnBrk="0" hangingPunct="1">
+      <a:defRPr sz="1200" kern="1200">
+        <a:solidFill>
+          <a:schemeClr val="tx1"/>
+        </a:solidFill>
+        <a:latin typeface="+mn-lt"/>
+        <a:ea typeface="+mn-ea"/>
+        <a:cs typeface="+mn-cs"/>
+      </a:defRPr>
+    </a:lvl3pPr>
+    <a:lvl4pPr marL="1371600" algn="l" defTabSz="914400" rtl="0" eaLnBrk="1" latinLnBrk="0" hangingPunct="1">
+      <a:defRPr sz="1200" kern="1200">
+        <a:solidFill>
+          <a:schemeClr val="tx1"/>
+        </a:solidFill>
+        <a:latin typeface="+mn-lt"/>
+        <a:ea typeface="+mn-ea"/>
+        <a:cs typeface="+mn-cs"/>
+      </a:defRPr>
+    </a:lvl4pPr>
+    <a:lvl5pPr marL="1828800" algn="l" defTabSz="914400" rtl="0" eaLnBrk="1" latinLnBrk="0" hangingPunct="1">
+      <a:defRPr sz="1200" kern="1200">
+        <a:solidFill>
+          <a:schemeClr val="tx1"/>
+        </a:solidFill>
+        <a:latin typeface="+mn-lt"/>
+        <a:ea typeface="+mn-ea"/>
+        <a:cs typeface="+mn-cs"/>
+      </a:defRPr>
+    </a:lvl5pPr>
+    <a:lvl6pPr marL="2286000" algn="l" defTabSz="914400" rtl="0" eaLnBrk="1" latinLnBrk="0" hangingPunct="1">
+      <a:defRPr sz="1200" kern="1200">
+        <a:solidFill>
+          <a:schemeClr val="tx1"/>
+        </a:solidFill>
+        <a:latin typeface="+mn-lt"/>
+        <a:ea typeface="+mn-ea"/>
+        <a:cs typeface="+mn-cs"/>
+      </a:defRPr>
+    </a:lvl6pPr>
+    <a:lvl7pPr marL="2743200" algn="l" defTabSz="914400" rtl="0" eaLnBrk="1" latinLnBrk="0" hangingPunct="1">
+      <a:defRPr sz="1200" kern="1200">
+        <a:solidFill>
+          <a:schemeClr val="tx1"/>
+        </a:solidFill>
+        <a:latin typeface="+mn-lt"/>
+        <a:ea typeface="+mn-ea"/>
+        <a:cs typeface="+mn-cs"/>
+      </a:defRPr>
+    </a:lvl7pPr>
+    <a:lvl8pPr marL="3200400" algn="l" defTabSz="914400" rtl="0" eaLnBrk="1" latinLnBrk="0" hangingPunct="1">
+      <a:defRPr sz="1200" kern="1200">
+        <a:solidFill>
+          <a:schemeClr val="tx1"/>
+        </a:solidFill>
+        <a:latin typeface="+mn-lt"/>
+        <a:ea typeface="+mn-ea"/>
+        <a:cs typeface="+mn-cs"/>
+      </a:defRPr>
+    </a:lvl8pPr>
+    <a:lvl9pPr marL="3657600" algn="l" defTabSz="914400" rtl="0" eaLnBrk="1" latinLnBrk="0" hangingPunct="1">
+      <a:defRPr sz="1200" kern="1200">
+        <a:solidFill>
+          <a:schemeClr val="tx1"/>
+        </a:solidFill>
+        <a:latin typeface="+mn-lt"/>
+        <a:ea typeface="+mn-ea"/>
+        <a:cs typeface="+mn-cs"/>
+      </a:defRPr>
+    </a:lvl9pPr>
+  </p:notesStyle>
+</p:notesMaster>
+</file>
+
+<file path=ppt/notesSlides/notesSlide1.xml><?xml version="1.0" encoding="utf-8"?>
+<p:notes xmlns:a="http://schemas.openxmlformats.org/drawingml/2006/main" xmlns:r="http://schemas.openxmlformats.org/officeDocument/2006/relationships" xmlns:p="http://schemas.openxmlformats.org/presentationml/2006/main">
+  <p:cSld>
+    <p:spTree>
+      <p:nvGrpSpPr>
+        <p:cNvPr id="1" name=""/>
+        <p:cNvGrpSpPr/>
+        <p:nvPr/>
+      </p:nvGrpSpPr>
+      <p:grpSpPr>
+        <a:xfrm>
+          <a:off x="0" y="0"/>
+          <a:ext cx="0" cy="0"/>
+          <a:chOff x="0" y="0"/>
+          <a:chExt cx="0" cy="0"/>
+        </a:xfrm>
+      </p:grpSpPr>
+      <p:sp>
+        <p:nvSpPr>
+          <p:cNvPr id="2" name="Slide Image Placeholder 1"/>
+          <p:cNvSpPr>
+            <a:spLocks noGrp="1" noRot="1" noChangeAspect="1"/>
+          </p:cNvSpPr>
+          <p:nvPr>
+            <p:ph type="sldImg"/>
+          </p:nvPr>
+        </p:nvSpPr>
+        <p:spPr/>
+      </p:sp>
+      <p:sp>
+        <p:nvSpPr>
+          <p:cNvPr id="3" name="Notes Placeholder 2"/>
+          <p:cNvSpPr>
+            <a:spLocks noGrp="1"/>
+          </p:cNvSpPr>
+          <p:nvPr>
+            <p:ph type="body" idx="1"/>
+          </p:nvPr>
+        </p:nvSpPr>
+        <p:spPr/>
+        <p:txBody>
+          <a:bodyPr/>
+          <a:lstStyle/>
+          <a:p>
+            <a:pPr marL="0" marR="0" lvl="1" indent="0" algn="l" defTabSz="914400" rtl="0" eaLnBrk="1" fontAlgn="auto" latinLnBrk="0" hangingPunct="1">
+              <a:lnSpc>
+                <a:spcPct val="100000"/>
+              </a:lnSpc>
+              <a:spcBef>
+                <a:spcPts val="0"/>
+              </a:spcBef>
+              <a:spcAft>
+                <a:spcPts val="0"/>
+              </a:spcAft>
+              <a:buClrTx/>
+              <a:buSzTx/>
+              <a:buFontTx/>
+              <a:buNone/>
+              <a:tabLst/>
+              <a:defRPr/>
+            </a:pPr>
+            <a:r>
+              <a:rPr lang="en-US" sz="2400" cap="none" dirty="0" smtClean="0"/>
+              <a:t>Frequently, users find it's time consuming to surf websites because they have experienced so much advertisement and unwanted information at one time.</a:t>
+            </a:r>
+          </a:p>
+          <a:p>
+            <a:endParaRPr lang="en-US" dirty="0"/>
+          </a:p>
+        </p:txBody>
+      </p:sp>
+      <p:sp>
+        <p:nvSpPr>
+          <p:cNvPr id="4" name="Slide Number Placeholder 3"/>
+          <p:cNvSpPr>
+            <a:spLocks noGrp="1"/>
+          </p:cNvSpPr>
+          <p:nvPr>
+            <p:ph type="sldNum" sz="quarter" idx="10"/>
+          </p:nvPr>
+        </p:nvSpPr>
+        <p:spPr/>
+        <p:txBody>
+          <a:bodyPr/>
+          <a:lstStyle/>
+          <a:p>
+            <a:fld id="{B1FA3DE5-F376-5C43-8067-372A6F277606}" type="slidenum">
+              <a:rPr lang="en-US" smtClean="0"/>
+              <a:t>3</a:t>
+            </a:fld>
+            <a:endParaRPr lang="en-US"/>
+          </a:p>
+        </p:txBody>
+      </p:sp>
+    </p:spTree>
+    <p:extLst>
+      <p:ext uri="{BB962C8B-B14F-4D97-AF65-F5344CB8AC3E}">
+        <p14:creationId xmlns:p14="http://schemas.microsoft.com/office/powerpoint/2010/main" val="1909002904"/>
+      </p:ext>
+    </p:extLst>
+  </p:cSld>
+  <p:clrMapOvr>
+    <a:masterClrMapping/>
+  </p:clrMapOvr>
+</p:notes>
+</file>
+
 <file path=ppt/slideLayouts/slideLayout1.xml><?xml version="1.0" encoding="utf-8"?>
 <p:sldLayout xmlns:a="http://schemas.openxmlformats.org/drawingml/2006/main" xmlns:r="http://schemas.openxmlformats.org/officeDocument/2006/relationships" xmlns:p="http://schemas.openxmlformats.org/presentationml/2006/main" type="title" preserve="1">
   <p:cSld name="Title Slide">
@@ -21241,6 +21828,36 @@
           </a:p>
         </p:txBody>
       </p:sp>
+      <p:pic>
+        <p:nvPicPr>
+          <p:cNvPr id="4" name="Picture 3"/>
+          <p:cNvPicPr>
+            <a:picLocks noChangeAspect="1"/>
+          </p:cNvPicPr>
+          <p:nvPr/>
+        </p:nvPicPr>
+        <p:blipFill>
+          <a:blip r:embed="rId3">
+            <a:extLst>
+              <a:ext uri="{28A0092B-C50C-407E-A947-70E740481C1C}">
+                <a14:useLocalDpi xmlns:a14="http://schemas.microsoft.com/office/drawing/2010/main" val="0"/>
+              </a:ext>
+            </a:extLst>
+          </a:blip>
+          <a:stretch>
+            <a:fillRect/>
+          </a:stretch>
+        </p:blipFill>
+        <p:spPr>
+          <a:xfrm>
+            <a:off x="7810500" y="2316490"/>
+            <a:ext cx="746750" cy="746750"/>
+          </a:xfrm>
+          <a:prstGeom prst="rect">
+            <a:avLst/>
+          </a:prstGeom>
+        </p:spPr>
+      </p:pic>
     </p:spTree>
     <p:extLst>
       <p:ext uri="{BB962C8B-B14F-4D97-AF65-F5344CB8AC3E}">
@@ -21920,7 +22537,7 @@
           <p:nvPr>
             <p:extLst>
               <p:ext uri="{D42A27DB-BD31-4B8C-83A1-F6EECF244321}">
-                <p14:modId xmlns:p14="http://schemas.microsoft.com/office/powerpoint/2010/main" val="2398030448"/>
+                <p14:modId xmlns:p14="http://schemas.microsoft.com/office/powerpoint/2010/main" val="2112255763"/>
               </p:ext>
             </p:extLst>
           </p:nvPr>
@@ -22065,7 +22682,23 @@
             </a:pPr>
             <a:r>
               <a:rPr lang="en-US" sz="2400" cap="none" dirty="0" smtClean="0"/>
-              <a:t>RSS is an easy way to share your website updates and content with your users so that users might not have to visit your site daily for any kind of updates.</a:t>
+              <a:t>RSS is an easy way to </a:t>
+            </a:r>
+            <a:r>
+              <a:rPr lang="en-US" sz="2400" cap="none" dirty="0" smtClean="0"/>
+              <a:t>follow website’s </a:t>
+            </a:r>
+            <a:r>
+              <a:rPr lang="en-US" sz="2400" cap="none" dirty="0" smtClean="0"/>
+              <a:t>updates and content </a:t>
+            </a:r>
+            <a:r>
+              <a:rPr lang="en-US" sz="2400" cap="none" dirty="0" smtClean="0"/>
+              <a:t>so </a:t>
+            </a:r>
+            <a:r>
+              <a:rPr lang="en-US" sz="2400" cap="none" dirty="0" smtClean="0"/>
+              <a:t>that users might not have to visit your site daily for any kind of updates.</a:t>
             </a:r>
           </a:p>
           <a:p>
@@ -22088,28 +22721,26 @@
             </a:pPr>
             <a:r>
               <a:rPr lang="en-US" sz="2400" cap="none" dirty="0" smtClean="0"/>
-              <a:t> Frequently, users find it's time consuming to surf websites because they have experienced so much advertisement and unwanted information at one time.</a:t>
+              <a:t> </a:t>
             </a:r>
-          </a:p>
-          <a:p>
-            <a:pPr lvl="1"/>
-            <a:endParaRPr lang="en-US" dirty="0"/>
-          </a:p>
-          <a:p>
+            <a:r>
+              <a:rPr lang="en-US" sz="2400" cap="none" dirty="0" smtClean="0"/>
+              <a:t>Keep contents concentration </a:t>
+            </a:r>
             <a:endParaRPr lang="en-US" dirty="0"/>
           </a:p>
         </p:txBody>
       </p:sp>
       <p:pic>
         <p:nvPicPr>
-          <p:cNvPr id="4" name="Picture 3"/>
+          <p:cNvPr id="5" name="Picture 4"/>
           <p:cNvPicPr>
             <a:picLocks noChangeAspect="1"/>
           </p:cNvPicPr>
           <p:nvPr/>
         </p:nvPicPr>
         <p:blipFill>
-          <a:blip r:embed="rId2">
+          <a:blip r:embed="rId3">
             <a:extLst>
               <a:ext uri="{28A0092B-C50C-407E-A947-70E740481C1C}">
                 <a14:useLocalDpi xmlns:a14="http://schemas.microsoft.com/office/drawing/2010/main" val="0"/>
@@ -22122,8 +22753,8 @@
         </p:blipFill>
         <p:spPr>
           <a:xfrm>
-            <a:off x="8884693" y="139700"/>
-            <a:ext cx="3153202" cy="2370054"/>
+            <a:off x="9349740" y="1225123"/>
+            <a:ext cx="1165860" cy="1165860"/>
           </a:xfrm>
           <a:prstGeom prst="rect">
             <a:avLst/>
@@ -22266,16 +22897,20 @@
               <a:buChar char="•"/>
             </a:pPr>
             <a:r>
-              <a:rPr lang="en-US" sz="2400" dirty="0"/>
-              <a:t> RSS feeds also benefit users who want to receive timely updates from </a:t>
-            </a:r>
-            <a:r>
-              <a:rPr lang="en-US" sz="2400" dirty="0" err="1"/>
-              <a:t>favourite</a:t>
+              <a:rPr lang="en-US" sz="2400" dirty="0" smtClean="0"/>
+              <a:t>RSS </a:t>
             </a:r>
             <a:r>
               <a:rPr lang="en-US" sz="2400" dirty="0"/>
-              <a:t> websites or to aggregate data from many sites.</a:t>
+              <a:t>feeds also benefit users who want to receive timely updates from </a:t>
+            </a:r>
+            <a:r>
+              <a:rPr lang="en-US" sz="2400" dirty="0" smtClean="0"/>
+              <a:t>favorite </a:t>
+            </a:r>
+            <a:r>
+              <a:rPr lang="en-US" sz="2400" dirty="0"/>
+              <a:t>websites or to aggregate data from many sites.</a:t>
             </a:r>
           </a:p>
           <a:p>
@@ -22313,7 +22948,7 @@
       </p:sp>
       <p:pic>
         <p:nvPicPr>
-          <p:cNvPr id="4" name="Picture 3"/>
+          <p:cNvPr id="5" name="Picture 4"/>
           <p:cNvPicPr>
             <a:picLocks noChangeAspect="1"/>
           </p:cNvPicPr>
@@ -22333,8 +22968,8 @@
         </p:blipFill>
         <p:spPr>
           <a:xfrm>
-            <a:off x="8625386" y="139700"/>
-            <a:ext cx="3153202" cy="2370054"/>
+            <a:off x="9415761" y="1310185"/>
+            <a:ext cx="1342932" cy="1342932"/>
           </a:xfrm>
           <a:prstGeom prst="rect">
             <a:avLst/>
@@ -22460,7 +23095,19 @@
             </a:pPr>
             <a:r>
               <a:rPr lang="en-US" sz="2400" cap="none" dirty="0" smtClean="0"/>
-              <a:t> We believe through this project, we could have a deep understanding on the android development and related technologies. </a:t>
+              <a:t>We </a:t>
+            </a:r>
+            <a:r>
+              <a:rPr lang="en-US" sz="2400" cap="none" dirty="0" smtClean="0"/>
+              <a:t>believe through this project, we could have a deep understanding on the </a:t>
+            </a:r>
+            <a:r>
+              <a:rPr lang="en-US" sz="2400" cap="none" dirty="0" smtClean="0"/>
+              <a:t>Android </a:t>
+            </a:r>
+            <a:r>
+              <a:rPr lang="en-US" sz="2400" cap="none" dirty="0" smtClean="0"/>
+              <a:t>development and related technologies. </a:t>
             </a:r>
           </a:p>
           <a:p>
@@ -22483,7 +23130,23 @@
             </a:pPr>
             <a:r>
               <a:rPr lang="en-US" sz="2400" cap="none" dirty="0" smtClean="0"/>
-              <a:t>We will use android studio to develop our project.</a:t>
+              <a:t>We will use </a:t>
+            </a:r>
+            <a:r>
+              <a:rPr lang="en-US" sz="2400" cap="none" dirty="0" smtClean="0"/>
+              <a:t>Android </a:t>
+            </a:r>
+            <a:r>
+              <a:rPr lang="en-US" sz="2400" cap="none" dirty="0"/>
+              <a:t>S</a:t>
+            </a:r>
+            <a:r>
+              <a:rPr lang="en-US" sz="2400" cap="none" dirty="0" smtClean="0"/>
+              <a:t>tudio </a:t>
+            </a:r>
+            <a:r>
+              <a:rPr lang="en-US" sz="2400" cap="none" dirty="0" smtClean="0"/>
+              <a:t>to develop our project.</a:t>
             </a:r>
           </a:p>
           <a:p>
@@ -23300,4 +23963,265 @@
     </a:ext>
   </a:extLst>
 </a:theme>
+</file>
+
+<file path=ppt/theme/theme2.xml><?xml version="1.0" encoding="utf-8"?>
+<a:theme xmlns:a="http://schemas.openxmlformats.org/drawingml/2006/main" name="Office Theme">
+  <a:themeElements>
+    <a:clrScheme name="Office">
+      <a:dk1>
+        <a:sysClr val="windowText" lastClr="000000"/>
+      </a:dk1>
+      <a:lt1>
+        <a:sysClr val="window" lastClr="FFFFFF"/>
+      </a:lt1>
+      <a:dk2>
+        <a:srgbClr val="44546A"/>
+      </a:dk2>
+      <a:lt2>
+        <a:srgbClr val="E7E6E6"/>
+      </a:lt2>
+      <a:accent1>
+        <a:srgbClr val="5B9BD5"/>
+      </a:accent1>
+      <a:accent2>
+        <a:srgbClr val="ED7D31"/>
+      </a:accent2>
+      <a:accent3>
+        <a:srgbClr val="A5A5A5"/>
+      </a:accent3>
+      <a:accent4>
+        <a:srgbClr val="FFC000"/>
+      </a:accent4>
+      <a:accent5>
+        <a:srgbClr val="4472C4"/>
+      </a:accent5>
+      <a:accent6>
+        <a:srgbClr val="70AD47"/>
+      </a:accent6>
+      <a:hlink>
+        <a:srgbClr val="0563C1"/>
+      </a:hlink>
+      <a:folHlink>
+        <a:srgbClr val="954F72"/>
+      </a:folHlink>
+    </a:clrScheme>
+    <a:fontScheme name="Office">
+      <a:majorFont>
+        <a:latin typeface="Calibri Light" panose="020F0302020204030204"/>
+        <a:ea typeface=""/>
+        <a:cs typeface=""/>
+        <a:font script="Jpan" typeface="ＭＳ Ｐゴシック"/>
+        <a:font script="Hang" typeface="맑은 고딕"/>
+        <a:font script="Hans" typeface="宋体"/>
+        <a:font script="Hant" typeface="新細明體"/>
+        <a:font script="Arab" typeface="Times New Roman"/>
+        <a:font script="Hebr" typeface="Times New Roman"/>
+        <a:font script="Thai" typeface="Angsana New"/>
+        <a:font script="Ethi" typeface="Nyala"/>
+        <a:font script="Beng" typeface="Vrinda"/>
+        <a:font script="Gujr" typeface="Shruti"/>
+        <a:font script="Khmr" typeface="MoolBoran"/>
+        <a:font script="Knda" typeface="Tunga"/>
+        <a:font script="Guru" typeface="Raavi"/>
+        <a:font script="Cans" typeface="Euphemia"/>
+        <a:font script="Cher" typeface="Plantagenet Cherokee"/>
+        <a:font script="Yiii" typeface="Microsoft Yi Baiti"/>
+        <a:font script="Tibt" typeface="Microsoft Himalaya"/>
+        <a:font script="Thaa" typeface="MV Boli"/>
+        <a:font script="Deva" typeface="Mangal"/>
+        <a:font script="Telu" typeface="Gautami"/>
+        <a:font script="Taml" typeface="Latha"/>
+        <a:font script="Syrc" typeface="Estrangelo Edessa"/>
+        <a:font script="Orya" typeface="Kalinga"/>
+        <a:font script="Mlym" typeface="Kartika"/>
+        <a:font script="Laoo" typeface="DokChampa"/>
+        <a:font script="Sinh" typeface="Iskoola Pota"/>
+        <a:font script="Mong" typeface="Mongolian Baiti"/>
+        <a:font script="Viet" typeface="Times New Roman"/>
+        <a:font script="Uigh" typeface="Microsoft Uighur"/>
+        <a:font script="Geor" typeface="Sylfaen"/>
+      </a:majorFont>
+      <a:minorFont>
+        <a:latin typeface="Calibri" panose="020F0502020204030204"/>
+        <a:ea typeface=""/>
+        <a:cs typeface=""/>
+        <a:font script="Jpan" typeface="ＭＳ Ｐゴシック"/>
+        <a:font script="Hang" typeface="맑은 고딕"/>
+        <a:font script="Hans" typeface="宋体"/>
+        <a:font script="Hant" typeface="新細明體"/>
+        <a:font script="Arab" typeface="Arial"/>
+        <a:font script="Hebr" typeface="Arial"/>
+        <a:font script="Thai" typeface="Cordia New"/>
+        <a:font script="Ethi" typeface="Nyala"/>
+        <a:font script="Beng" typeface="Vrinda"/>
+        <a:font script="Gujr" typeface="Shruti"/>
+        <a:font script="Khmr" typeface="DaunPenh"/>
+        <a:font script="Knda" typeface="Tunga"/>
+        <a:font script="Guru" typeface="Raavi"/>
+        <a:font script="Cans" typeface="Euphemia"/>
+        <a:font script="Cher" typeface="Plantagenet Cherokee"/>
+        <a:font script="Yiii" typeface="Microsoft Yi Baiti"/>
+        <a:font script="Tibt" typeface="Microsoft Himalaya"/>
+        <a:font script="Thaa" typeface="MV Boli"/>
+        <a:font script="Deva" typeface="Mangal"/>
+        <a:font script="Telu" typeface="Gautami"/>
+        <a:font script="Taml" typeface="Latha"/>
+        <a:font script="Syrc" typeface="Estrangelo Edessa"/>
+        <a:font script="Orya" typeface="Kalinga"/>
+        <a:font script="Mlym" typeface="Kartika"/>
+        <a:font script="Laoo" typeface="DokChampa"/>
+        <a:font script="Sinh" typeface="Iskoola Pota"/>
+        <a:font script="Mong" typeface="Mongolian Baiti"/>
+        <a:font script="Viet" typeface="Arial"/>
+        <a:font script="Uigh" typeface="Microsoft Uighur"/>
+        <a:font script="Geor" typeface="Sylfaen"/>
+      </a:minorFont>
+    </a:fontScheme>
+    <a:fmtScheme name="Office">
+      <a:fillStyleLst>
+        <a:solidFill>
+          <a:schemeClr val="phClr"/>
+        </a:solidFill>
+        <a:gradFill rotWithShape="1">
+          <a:gsLst>
+            <a:gs pos="0">
+              <a:schemeClr val="phClr">
+                <a:lumMod val="110000"/>
+                <a:satMod val="105000"/>
+                <a:tint val="67000"/>
+              </a:schemeClr>
+            </a:gs>
+            <a:gs pos="50000">
+              <a:schemeClr val="phClr">
+                <a:lumMod val="105000"/>
+                <a:satMod val="103000"/>
+                <a:tint val="73000"/>
+              </a:schemeClr>
+            </a:gs>
+            <a:gs pos="100000">
+              <a:schemeClr val="phClr">
+                <a:lumMod val="105000"/>
+                <a:satMod val="109000"/>
+                <a:tint val="81000"/>
+              </a:schemeClr>
+            </a:gs>
+          </a:gsLst>
+          <a:lin ang="5400000" scaled="0"/>
+        </a:gradFill>
+        <a:gradFill rotWithShape="1">
+          <a:gsLst>
+            <a:gs pos="0">
+              <a:schemeClr val="phClr">
+                <a:satMod val="103000"/>
+                <a:lumMod val="102000"/>
+                <a:tint val="94000"/>
+              </a:schemeClr>
+            </a:gs>
+            <a:gs pos="50000">
+              <a:schemeClr val="phClr">
+                <a:satMod val="110000"/>
+                <a:lumMod val="100000"/>
+                <a:shade val="100000"/>
+              </a:schemeClr>
+            </a:gs>
+            <a:gs pos="100000">
+              <a:schemeClr val="phClr">
+                <a:lumMod val="99000"/>
+                <a:satMod val="120000"/>
+                <a:shade val="78000"/>
+              </a:schemeClr>
+            </a:gs>
+          </a:gsLst>
+          <a:lin ang="5400000" scaled="0"/>
+        </a:gradFill>
+      </a:fillStyleLst>
+      <a:lnStyleLst>
+        <a:ln w="6350" cap="flat" cmpd="sng" algn="ctr">
+          <a:solidFill>
+            <a:schemeClr val="phClr"/>
+          </a:solidFill>
+          <a:prstDash val="solid"/>
+          <a:miter lim="800000"/>
+        </a:ln>
+        <a:ln w="12700" cap="flat" cmpd="sng" algn="ctr">
+          <a:solidFill>
+            <a:schemeClr val="phClr"/>
+          </a:solidFill>
+          <a:prstDash val="solid"/>
+          <a:miter lim="800000"/>
+        </a:ln>
+        <a:ln w="19050" cap="flat" cmpd="sng" algn="ctr">
+          <a:solidFill>
+            <a:schemeClr val="phClr"/>
+          </a:solidFill>
+          <a:prstDash val="solid"/>
+          <a:miter lim="800000"/>
+        </a:ln>
+      </a:lnStyleLst>
+      <a:effectStyleLst>
+        <a:effectStyle>
+          <a:effectLst/>
+        </a:effectStyle>
+        <a:effectStyle>
+          <a:effectLst/>
+        </a:effectStyle>
+        <a:effectStyle>
+          <a:effectLst>
+            <a:outerShdw blurRad="57150" dist="19050" dir="5400000" algn="ctr" rotWithShape="0">
+              <a:srgbClr val="000000">
+                <a:alpha val="63000"/>
+              </a:srgbClr>
+            </a:outerShdw>
+          </a:effectLst>
+        </a:effectStyle>
+      </a:effectStyleLst>
+      <a:bgFillStyleLst>
+        <a:solidFill>
+          <a:schemeClr val="phClr"/>
+        </a:solidFill>
+        <a:solidFill>
+          <a:schemeClr val="phClr">
+            <a:tint val="95000"/>
+            <a:satMod val="170000"/>
+          </a:schemeClr>
+        </a:solidFill>
+        <a:gradFill rotWithShape="1">
+          <a:gsLst>
+            <a:gs pos="0">
+              <a:schemeClr val="phClr">
+                <a:tint val="93000"/>
+                <a:satMod val="150000"/>
+                <a:shade val="98000"/>
+                <a:lumMod val="102000"/>
+              </a:schemeClr>
+            </a:gs>
+            <a:gs pos="50000">
+              <a:schemeClr val="phClr">
+                <a:tint val="98000"/>
+                <a:satMod val="130000"/>
+                <a:shade val="90000"/>
+                <a:lumMod val="103000"/>
+              </a:schemeClr>
+            </a:gs>
+            <a:gs pos="100000">
+              <a:schemeClr val="phClr">
+                <a:shade val="63000"/>
+                <a:satMod val="120000"/>
+              </a:schemeClr>
+            </a:gs>
+          </a:gsLst>
+          <a:lin ang="5400000" scaled="0"/>
+        </a:gradFill>
+      </a:bgFillStyleLst>
+    </a:fmtScheme>
+  </a:themeElements>
+  <a:objectDefaults/>
+  <a:extraClrSchemeLst/>
+  <a:extLst>
+    <a:ext uri="{05A4C25C-085E-4340-85A3-A5531E510DB2}">
+      <thm15:themeFamily xmlns:thm15="http://schemas.microsoft.com/office/thememl/2012/main" name="Office Theme" id="{62F939B6-93AF-4DB8-9C6B-D6C7DFDC589F}" vid="{4A3C46E8-61CC-4603-A589-7422A47A8E4A}"/>
+    </a:ext>
+  </a:extLst>
+</a:theme>
 </file>
</xml_diff>

<commit_message>
fixed typo in slides 1-5
</commit_message>
<xml_diff>
--- a/ProjectCS639.pptx
+++ b/ProjectCS639.pptx
@@ -4337,29 +4337,13 @@
         <a:p>
           <a:r>
             <a:rPr lang="en-US" dirty="0" smtClean="0"/>
-            <a:t>RSS (Rich Site Summary</a:t>
-          </a:r>
-          <a:r>
-            <a:rPr lang="en-US" dirty="0" smtClean="0"/>
-            <a:t>), </a:t>
-          </a:r>
-          <a:r>
-            <a:rPr lang="en-US" dirty="0" smtClean="0"/>
-            <a:t>often called Really Simple </a:t>
-          </a:r>
-          <a:r>
-            <a:rPr lang="en-US" dirty="0" smtClean="0"/>
-            <a:t>Syndication</a:t>
+            <a:t>RSS (Rich Site Summary), often called Really Simple Syndication</a:t>
           </a:r>
         </a:p>
         <a:p>
           <a:r>
             <a:rPr lang="en-US" dirty="0" smtClean="0"/>
-            <a:t>Uses </a:t>
-          </a:r>
-          <a:r>
-            <a:rPr lang="en-US" dirty="0" smtClean="0"/>
-            <a:t>a family of standard web feed formats</a:t>
+            <a:t>Uses a family of standard web feed formats</a:t>
           </a:r>
           <a:endParaRPr lang="en-US" dirty="0"/>
         </a:p>
@@ -4396,19 +4380,7 @@
         <a:p>
           <a:r>
             <a:rPr lang="en-US" dirty="0" smtClean="0"/>
-            <a:t>Create a personal news feed and read </a:t>
-          </a:r>
-          <a:r>
-            <a:rPr lang="en-US" dirty="0" smtClean="0"/>
-            <a:t>websites in </a:t>
-          </a:r>
-          <a:r>
-            <a:rPr lang="en-US" dirty="0" smtClean="0"/>
-            <a:t>a clean and intuitive </a:t>
-          </a:r>
-          <a:r>
-            <a:rPr lang="en-US" dirty="0" smtClean="0"/>
-            <a:t>format</a:t>
+            <a:t>Create a personal news feed and read websites in a clean and intuitive format</a:t>
           </a:r>
           <a:endParaRPr lang="en-US" dirty="0"/>
         </a:p>
@@ -4445,31 +4417,7 @@
         <a:p>
           <a:r>
             <a:rPr lang="en-US" dirty="0" smtClean="0"/>
-            <a:t>Subscribe </a:t>
-          </a:r>
-          <a:r>
-            <a:rPr lang="en-US" dirty="0" smtClean="0"/>
-            <a:t>many </a:t>
-          </a:r>
-          <a:r>
-            <a:rPr lang="en-US" dirty="0" smtClean="0"/>
-            <a:t>feeds </a:t>
-          </a:r>
-          <a:r>
-            <a:rPr lang="en-US" dirty="0" smtClean="0"/>
-            <a:t>and </a:t>
-          </a:r>
-          <a:r>
-            <a:rPr lang="en-US" dirty="0" smtClean="0"/>
-            <a:t>keep </a:t>
-          </a:r>
-          <a:r>
-            <a:rPr lang="en-US" dirty="0" smtClean="0"/>
-            <a:t>updates with the sources</a:t>
-          </a:r>
-          <a:r>
-            <a:rPr lang="en-US" dirty="0" smtClean="0"/>
-            <a:t>	</a:t>
+            <a:t>Subscribe many feeds and keep updates with the sources	</a:t>
           </a:r>
           <a:endParaRPr lang="en-US" dirty="0"/>
         </a:p>
@@ -5692,19 +5640,19 @@
     </dgm:pt>
   </dgm:ptLst>
   <dgm:cxnLst>
+    <dgm:cxn modelId="{EC2B3477-C13E-4D10-8987-0AA6FFD4E9B6}" type="presOf" srcId="{9A9D5A0B-5696-4692-A878-6377F4B48E0F}" destId="{61058727-6B8E-41F1-9631-03B859BE9760}" srcOrd="0" destOrd="0" presId="urn:microsoft.com/office/officeart/2005/8/layout/hList6"/>
+    <dgm:cxn modelId="{7DE7B21F-07B7-4CEE-B70F-380C343C635D}" srcId="{88EF9924-716E-42E9-AB64-687B0D5F0E27}" destId="{408B3C1A-0D12-4C63-A2E7-15D8F4FCEBA0}" srcOrd="3" destOrd="0" parTransId="{78562F05-CE75-4676-84ED-F0D7EFB7FD63}" sibTransId="{863B1D93-9C21-4B9F-B33E-63325EAFE734}"/>
+    <dgm:cxn modelId="{4D665D7E-E5AD-4023-9ADA-B48181648234}" type="presOf" srcId="{31DFA831-79CF-43D4-92BE-043E5D1306FD}" destId="{13EE3AD0-0002-4DDD-81A1-35E0F1E19713}" srcOrd="0" destOrd="0" presId="urn:microsoft.com/office/officeart/2005/8/layout/hList6"/>
+    <dgm:cxn modelId="{EC267472-C5C5-4FBE-9AEC-398D3CA18A7E}" type="presOf" srcId="{FC47F4CD-37E3-4A69-8C8E-6FED298031AB}" destId="{3D9FB879-71A3-4867-8E84-F0A4F3CC1359}" srcOrd="0" destOrd="0" presId="urn:microsoft.com/office/officeart/2005/8/layout/hList6"/>
+    <dgm:cxn modelId="{F1534FD1-1A31-4970-B41A-D52E69207035}" type="presOf" srcId="{5A3F655D-86D8-4CAD-A1BB-72CF833D7F2C}" destId="{13831478-F23F-4100-A7E7-DE06624862DD}" srcOrd="0" destOrd="0" presId="urn:microsoft.com/office/officeart/2005/8/layout/hList6"/>
+    <dgm:cxn modelId="{DA67F082-ADA9-47C1-901A-FEBFA87C4ADC}" srcId="{88EF9924-716E-42E9-AB64-687B0D5F0E27}" destId="{FC47F4CD-37E3-4A69-8C8E-6FED298031AB}" srcOrd="1" destOrd="0" parTransId="{74C6D44E-3C2D-4CC3-A480-760268813022}" sibTransId="{61CF9D07-01F8-48C7-9E28-D9EC59EBE1D5}"/>
+    <dgm:cxn modelId="{72F9427B-E606-47DC-9C91-E47DD01A7F85}" type="presOf" srcId="{EF20D36D-B52E-4CF1-971B-8898885FF5E8}" destId="{A96E5A5A-E01C-4047-A91D-2A19F32207CC}" srcOrd="0" destOrd="0" presId="urn:microsoft.com/office/officeart/2005/8/layout/hList6"/>
     <dgm:cxn modelId="{3EDC4C70-B80B-448D-83B3-83C2D631D441}" srcId="{88EF9924-716E-42E9-AB64-687B0D5F0E27}" destId="{5A3F655D-86D8-4CAD-A1BB-72CF833D7F2C}" srcOrd="2" destOrd="0" parTransId="{B99E623B-9B6F-4BE0-A08F-4E417DDEF87E}" sibTransId="{E58A5292-0E8D-4134-81CD-492CBA8C8AC4}"/>
-    <dgm:cxn modelId="{F1534FD1-1A31-4970-B41A-D52E69207035}" type="presOf" srcId="{5A3F655D-86D8-4CAD-A1BB-72CF833D7F2C}" destId="{13831478-F23F-4100-A7E7-DE06624862DD}" srcOrd="0" destOrd="0" presId="urn:microsoft.com/office/officeart/2005/8/layout/hList6"/>
+    <dgm:cxn modelId="{814F0F62-1339-4920-B36B-323AD6046FA2}" srcId="{88EF9924-716E-42E9-AB64-687B0D5F0E27}" destId="{9A9D5A0B-5696-4692-A878-6377F4B48E0F}" srcOrd="4" destOrd="0" parTransId="{022FA54A-605C-43C6-AA65-F23AD18215C2}" sibTransId="{238B5600-741D-458F-810B-5A71A32345B9}"/>
+    <dgm:cxn modelId="{184A5F98-C996-452A-992D-5F4B6CA57C0A}" type="presOf" srcId="{408B3C1A-0D12-4C63-A2E7-15D8F4FCEBA0}" destId="{B4CAADBC-3A4C-43AC-BC0E-C0C2F47C8D8F}" srcOrd="0" destOrd="0" presId="urn:microsoft.com/office/officeart/2005/8/layout/hList6"/>
+    <dgm:cxn modelId="{9ACD5AD3-AA0A-44E3-9F01-4779FB2212DC}" srcId="{88EF9924-716E-42E9-AB64-687B0D5F0E27}" destId="{EF20D36D-B52E-4CF1-971B-8898885FF5E8}" srcOrd="5" destOrd="0" parTransId="{F5823B95-3220-40EB-9DEB-26C374075715}" sibTransId="{E4FDB41E-761F-4CFC-A81B-8F237A38A65B}"/>
+    <dgm:cxn modelId="{007171E9-1D23-4447-9478-BB66E7BC6C30}" type="presOf" srcId="{88EF9924-716E-42E9-AB64-687B0D5F0E27}" destId="{692B4974-C617-434A-8776-2F70C6503C51}" srcOrd="0" destOrd="0" presId="urn:microsoft.com/office/officeart/2005/8/layout/hList6"/>
     <dgm:cxn modelId="{68FAED8C-6741-4353-AA0A-F3D25919AD33}" srcId="{88EF9924-716E-42E9-AB64-687B0D5F0E27}" destId="{31DFA831-79CF-43D4-92BE-043E5D1306FD}" srcOrd="0" destOrd="0" parTransId="{751DE861-30E9-413B-B750-4FCEF6CAEDD4}" sibTransId="{B2D062BE-BB05-4733-8C3F-10C333BFFCD8}"/>
-    <dgm:cxn modelId="{9ACD5AD3-AA0A-44E3-9F01-4779FB2212DC}" srcId="{88EF9924-716E-42E9-AB64-687B0D5F0E27}" destId="{EF20D36D-B52E-4CF1-971B-8898885FF5E8}" srcOrd="5" destOrd="0" parTransId="{F5823B95-3220-40EB-9DEB-26C374075715}" sibTransId="{E4FDB41E-761F-4CFC-A81B-8F237A38A65B}"/>
-    <dgm:cxn modelId="{EC2B3477-C13E-4D10-8987-0AA6FFD4E9B6}" type="presOf" srcId="{9A9D5A0B-5696-4692-A878-6377F4B48E0F}" destId="{61058727-6B8E-41F1-9631-03B859BE9760}" srcOrd="0" destOrd="0" presId="urn:microsoft.com/office/officeart/2005/8/layout/hList6"/>
-    <dgm:cxn modelId="{184A5F98-C996-452A-992D-5F4B6CA57C0A}" type="presOf" srcId="{408B3C1A-0D12-4C63-A2E7-15D8F4FCEBA0}" destId="{B4CAADBC-3A4C-43AC-BC0E-C0C2F47C8D8F}" srcOrd="0" destOrd="0" presId="urn:microsoft.com/office/officeart/2005/8/layout/hList6"/>
-    <dgm:cxn modelId="{7DE7B21F-07B7-4CEE-B70F-380C343C635D}" srcId="{88EF9924-716E-42E9-AB64-687B0D5F0E27}" destId="{408B3C1A-0D12-4C63-A2E7-15D8F4FCEBA0}" srcOrd="3" destOrd="0" parTransId="{78562F05-CE75-4676-84ED-F0D7EFB7FD63}" sibTransId="{863B1D93-9C21-4B9F-B33E-63325EAFE734}"/>
-    <dgm:cxn modelId="{007171E9-1D23-4447-9478-BB66E7BC6C30}" type="presOf" srcId="{88EF9924-716E-42E9-AB64-687B0D5F0E27}" destId="{692B4974-C617-434A-8776-2F70C6503C51}" srcOrd="0" destOrd="0" presId="urn:microsoft.com/office/officeart/2005/8/layout/hList6"/>
-    <dgm:cxn modelId="{72F9427B-E606-47DC-9C91-E47DD01A7F85}" type="presOf" srcId="{EF20D36D-B52E-4CF1-971B-8898885FF5E8}" destId="{A96E5A5A-E01C-4047-A91D-2A19F32207CC}" srcOrd="0" destOrd="0" presId="urn:microsoft.com/office/officeart/2005/8/layout/hList6"/>
-    <dgm:cxn modelId="{4D665D7E-E5AD-4023-9ADA-B48181648234}" type="presOf" srcId="{31DFA831-79CF-43D4-92BE-043E5D1306FD}" destId="{13EE3AD0-0002-4DDD-81A1-35E0F1E19713}" srcOrd="0" destOrd="0" presId="urn:microsoft.com/office/officeart/2005/8/layout/hList6"/>
-    <dgm:cxn modelId="{DA67F082-ADA9-47C1-901A-FEBFA87C4ADC}" srcId="{88EF9924-716E-42E9-AB64-687B0D5F0E27}" destId="{FC47F4CD-37E3-4A69-8C8E-6FED298031AB}" srcOrd="1" destOrd="0" parTransId="{74C6D44E-3C2D-4CC3-A480-760268813022}" sibTransId="{61CF9D07-01F8-48C7-9E28-D9EC59EBE1D5}"/>
-    <dgm:cxn modelId="{EC267472-C5C5-4FBE-9AEC-398D3CA18A7E}" type="presOf" srcId="{FC47F4CD-37E3-4A69-8C8E-6FED298031AB}" destId="{3D9FB879-71A3-4867-8E84-F0A4F3CC1359}" srcOrd="0" destOrd="0" presId="urn:microsoft.com/office/officeart/2005/8/layout/hList6"/>
-    <dgm:cxn modelId="{814F0F62-1339-4920-B36B-323AD6046FA2}" srcId="{88EF9924-716E-42E9-AB64-687B0D5F0E27}" destId="{9A9D5A0B-5696-4692-A878-6377F4B48E0F}" srcOrd="4" destOrd="0" parTransId="{022FA54A-605C-43C6-AA65-F23AD18215C2}" sibTransId="{238B5600-741D-458F-810B-5A71A32345B9}"/>
     <dgm:cxn modelId="{CE631BB9-76E1-4147-8C3C-78C27834A0F6}" type="presParOf" srcId="{692B4974-C617-434A-8776-2F70C6503C51}" destId="{13EE3AD0-0002-4DDD-81A1-35E0F1E19713}" srcOrd="0" destOrd="0" presId="urn:microsoft.com/office/officeart/2005/8/layout/hList6"/>
     <dgm:cxn modelId="{702017B9-54FA-475D-A612-1B204F42DD07}" type="presParOf" srcId="{692B4974-C617-434A-8776-2F70C6503C51}" destId="{C48B6298-C863-4E87-8FA4-0913B94604A3}" srcOrd="1" destOrd="0" presId="urn:microsoft.com/office/officeart/2005/8/layout/hList6"/>
     <dgm:cxn modelId="{F9E0157A-07E4-4383-914E-1FEA355CEF97}" type="presParOf" srcId="{692B4974-C617-434A-8776-2F70C6503C51}" destId="{3D9FB879-71A3-4867-8E84-F0A4F3CC1359}" srcOrd="2" destOrd="0" presId="urn:microsoft.com/office/officeart/2005/8/layout/hList6"/>
@@ -6105,19 +6053,7 @@
           </a:pPr>
           <a:r>
             <a:rPr lang="en-US" sz="2400" kern="1200" dirty="0" smtClean="0"/>
-            <a:t>RSS (Rich Site Summary</a:t>
-          </a:r>
-          <a:r>
-            <a:rPr lang="en-US" sz="2400" kern="1200" dirty="0" smtClean="0"/>
-            <a:t>), </a:t>
-          </a:r>
-          <a:r>
-            <a:rPr lang="en-US" sz="2400" kern="1200" dirty="0" smtClean="0"/>
-            <a:t>often called Really Simple </a:t>
-          </a:r>
-          <a:r>
-            <a:rPr lang="en-US" sz="2400" kern="1200" dirty="0" smtClean="0"/>
-            <a:t>Syndication</a:t>
+            <a:t>RSS (Rich Site Summary), often called Really Simple Syndication</a:t>
           </a:r>
         </a:p>
         <a:p>
@@ -6134,11 +6070,7 @@
           </a:pPr>
           <a:r>
             <a:rPr lang="en-US" sz="2400" kern="1200" dirty="0" smtClean="0"/>
-            <a:t>Uses </a:t>
-          </a:r>
-          <a:r>
-            <a:rPr lang="en-US" sz="2400" kern="1200" dirty="0" smtClean="0"/>
-            <a:t>a family of standard web feed formats</a:t>
+            <a:t>Uses a family of standard web feed formats</a:t>
           </a:r>
           <a:endParaRPr lang="en-US" sz="2400" kern="1200" dirty="0"/>
         </a:p>
@@ -6262,19 +6194,7 @@
           </a:pPr>
           <a:r>
             <a:rPr lang="en-US" sz="2400" kern="1200" dirty="0" smtClean="0"/>
-            <a:t>Create a personal news feed and read </a:t>
-          </a:r>
-          <a:r>
-            <a:rPr lang="en-US" sz="2400" kern="1200" dirty="0" smtClean="0"/>
-            <a:t>websites in </a:t>
-          </a:r>
-          <a:r>
-            <a:rPr lang="en-US" sz="2400" kern="1200" dirty="0" smtClean="0"/>
-            <a:t>a clean and intuitive </a:t>
-          </a:r>
-          <a:r>
-            <a:rPr lang="en-US" sz="2400" kern="1200" dirty="0" smtClean="0"/>
-            <a:t>format</a:t>
+            <a:t>Create a personal news feed and read websites in a clean and intuitive format</a:t>
           </a:r>
           <a:endParaRPr lang="en-US" sz="2400" kern="1200" dirty="0"/>
         </a:p>
@@ -6398,31 +6318,7 @@
           </a:pPr>
           <a:r>
             <a:rPr lang="en-US" sz="2400" kern="1200" dirty="0" smtClean="0"/>
-            <a:t>Subscribe </a:t>
-          </a:r>
-          <a:r>
-            <a:rPr lang="en-US" sz="2400" kern="1200" dirty="0" smtClean="0"/>
-            <a:t>many </a:t>
-          </a:r>
-          <a:r>
-            <a:rPr lang="en-US" sz="2400" kern="1200" dirty="0" smtClean="0"/>
-            <a:t>feeds </a:t>
-          </a:r>
-          <a:r>
-            <a:rPr lang="en-US" sz="2400" kern="1200" dirty="0" smtClean="0"/>
-            <a:t>and </a:t>
-          </a:r>
-          <a:r>
-            <a:rPr lang="en-US" sz="2400" kern="1200" dirty="0" smtClean="0"/>
-            <a:t>keep </a:t>
-          </a:r>
-          <a:r>
-            <a:rPr lang="en-US" sz="2400" kern="1200" dirty="0" smtClean="0"/>
-            <a:t>updates with the sources</a:t>
-          </a:r>
-          <a:r>
-            <a:rPr lang="en-US" sz="2400" kern="1200" dirty="0" smtClean="0"/>
-            <a:t>	</a:t>
+            <a:t>Subscribe many feeds and keep updates with the sources	</a:t>
           </a:r>
           <a:endParaRPr lang="en-US" sz="2400" kern="1200" dirty="0"/>
         </a:p>
@@ -22682,23 +22578,7 @@
             </a:pPr>
             <a:r>
               <a:rPr lang="en-US" sz="2400" cap="none" dirty="0" smtClean="0"/>
-              <a:t>RSS is an easy way to </a:t>
-            </a:r>
-            <a:r>
-              <a:rPr lang="en-US" sz="2400" cap="none" dirty="0" smtClean="0"/>
-              <a:t>follow website’s </a:t>
-            </a:r>
-            <a:r>
-              <a:rPr lang="en-US" sz="2400" cap="none" dirty="0" smtClean="0"/>
-              <a:t>updates and content </a:t>
-            </a:r>
-            <a:r>
-              <a:rPr lang="en-US" sz="2400" cap="none" dirty="0" smtClean="0"/>
-              <a:t>so </a:t>
-            </a:r>
-            <a:r>
-              <a:rPr lang="en-US" sz="2400" cap="none" dirty="0" smtClean="0"/>
-              <a:t>that users might not have to visit your site daily for any kind of updates.</a:t>
+              <a:t>RSS is an easy way to follow website’s updates and content so that users might not have to visit your site daily for any kind of updates.</a:t>
             </a:r>
           </a:p>
           <a:p>
@@ -22721,11 +22601,7 @@
             </a:pPr>
             <a:r>
               <a:rPr lang="en-US" sz="2400" cap="none" dirty="0" smtClean="0"/>
-              <a:t> </a:t>
-            </a:r>
-            <a:r>
-              <a:rPr lang="en-US" sz="2400" cap="none" dirty="0" smtClean="0"/>
-              <a:t>Keep contents concentration </a:t>
+              <a:t> Keep contents concentration </a:t>
             </a:r>
             <a:endParaRPr lang="en-US" dirty="0"/>
           </a:p>
@@ -23072,7 +22948,23 @@
             </a:pPr>
             <a:r>
               <a:rPr lang="en-US" sz="2400" cap="none" dirty="0" smtClean="0"/>
-              <a:t>Our goal is to provide an easy and fast way to read useful information through a mobile device with clear and nice view of layout on it.</a:t>
+              <a:t>Our goal is to provide an </a:t>
+            </a:r>
+            <a:r>
+              <a:rPr lang="en-US" sz="2400" cap="none" dirty="0" smtClean="0"/>
+              <a:t>easy </a:t>
+            </a:r>
+            <a:r>
+              <a:rPr lang="en-US" sz="2400" cap="none" dirty="0" smtClean="0"/>
+              <a:t>way to read </a:t>
+            </a:r>
+            <a:r>
+              <a:rPr lang="en-US" sz="2400" cap="none" dirty="0" smtClean="0"/>
+              <a:t>RSS feed through </a:t>
+            </a:r>
+            <a:r>
+              <a:rPr lang="en-US" sz="2400" cap="none" dirty="0" smtClean="0"/>
+              <a:t>a mobile device with clear and nice view of layout on it.</a:t>
             </a:r>
           </a:p>
           <a:p>
@@ -23095,19 +22987,7 @@
             </a:pPr>
             <a:r>
               <a:rPr lang="en-US" sz="2400" cap="none" dirty="0" smtClean="0"/>
-              <a:t>We </a:t>
-            </a:r>
-            <a:r>
-              <a:rPr lang="en-US" sz="2400" cap="none" dirty="0" smtClean="0"/>
-              <a:t>believe through this project, we could have a deep understanding on the </a:t>
-            </a:r>
-            <a:r>
-              <a:rPr lang="en-US" sz="2400" cap="none" dirty="0" smtClean="0"/>
-              <a:t>Android </a:t>
-            </a:r>
-            <a:r>
-              <a:rPr lang="en-US" sz="2400" cap="none" dirty="0" smtClean="0"/>
-              <a:t>development and related technologies. </a:t>
+              <a:t>We believe through this project, we could have a deep understanding on the Android development and related technologies. </a:t>
             </a:r>
           </a:p>
           <a:p>
@@ -23130,11 +23010,7 @@
             </a:pPr>
             <a:r>
               <a:rPr lang="en-US" sz="2400" cap="none" dirty="0" smtClean="0"/>
-              <a:t>We will use </a:t>
-            </a:r>
-            <a:r>
-              <a:rPr lang="en-US" sz="2400" cap="none" dirty="0" smtClean="0"/>
-              <a:t>Android </a:t>
+              <a:t>We will use Android </a:t>
             </a:r>
             <a:r>
               <a:rPr lang="en-US" sz="2400" cap="none" dirty="0"/>
@@ -23142,11 +23018,7 @@
             </a:r>
             <a:r>
               <a:rPr lang="en-US" sz="2400" cap="none" dirty="0" smtClean="0"/>
-              <a:t>tudio </a:t>
-            </a:r>
-            <a:r>
-              <a:rPr lang="en-US" sz="2400" cap="none" dirty="0" smtClean="0"/>
-              <a:t>to develop our project.</a:t>
+              <a:t>tudio to develop our project.</a:t>
             </a:r>
           </a:p>
           <a:p>

</xml_diff>

<commit_message>
replace SAX to SAX API in ppt. it's an good simple api for XML phrase.
</commit_message>
<xml_diff>
--- a/ProjectCS639.pptx
+++ b/ProjectCS639.pptx
@@ -5052,7 +5052,17 @@
         <a:p>
           <a:r>
             <a:rPr lang="en-US" dirty="0" smtClean="0"/>
-            <a:t>Parse XML in Android</a:t>
+            <a:t>Parse XML in </a:t>
+          </a:r>
+          <a:r>
+            <a:rPr lang="en-US" dirty="0" smtClean="0"/>
+            <a:t>Android</a:t>
+          </a:r>
+        </a:p>
+        <a:p>
+          <a:r>
+            <a:rPr lang="en-US" dirty="0" smtClean="0"/>
+            <a:t>SAX API</a:t>
           </a:r>
           <a:endParaRPr lang="en-US" dirty="0"/>
         </a:p>
@@ -5640,19 +5650,19 @@
     </dgm:pt>
   </dgm:ptLst>
   <dgm:cxnLst>
+    <dgm:cxn modelId="{3EDC4C70-B80B-448D-83B3-83C2D631D441}" srcId="{88EF9924-716E-42E9-AB64-687B0D5F0E27}" destId="{5A3F655D-86D8-4CAD-A1BB-72CF833D7F2C}" srcOrd="2" destOrd="0" parTransId="{B99E623B-9B6F-4BE0-A08F-4E417DDEF87E}" sibTransId="{E58A5292-0E8D-4134-81CD-492CBA8C8AC4}"/>
+    <dgm:cxn modelId="{F1534FD1-1A31-4970-B41A-D52E69207035}" type="presOf" srcId="{5A3F655D-86D8-4CAD-A1BB-72CF833D7F2C}" destId="{13831478-F23F-4100-A7E7-DE06624862DD}" srcOrd="0" destOrd="0" presId="urn:microsoft.com/office/officeart/2005/8/layout/hList6"/>
+    <dgm:cxn modelId="{68FAED8C-6741-4353-AA0A-F3D25919AD33}" srcId="{88EF9924-716E-42E9-AB64-687B0D5F0E27}" destId="{31DFA831-79CF-43D4-92BE-043E5D1306FD}" srcOrd="0" destOrd="0" parTransId="{751DE861-30E9-413B-B750-4FCEF6CAEDD4}" sibTransId="{B2D062BE-BB05-4733-8C3F-10C333BFFCD8}"/>
+    <dgm:cxn modelId="{9ACD5AD3-AA0A-44E3-9F01-4779FB2212DC}" srcId="{88EF9924-716E-42E9-AB64-687B0D5F0E27}" destId="{EF20D36D-B52E-4CF1-971B-8898885FF5E8}" srcOrd="5" destOrd="0" parTransId="{F5823B95-3220-40EB-9DEB-26C374075715}" sibTransId="{E4FDB41E-761F-4CFC-A81B-8F237A38A65B}"/>
     <dgm:cxn modelId="{EC2B3477-C13E-4D10-8987-0AA6FFD4E9B6}" type="presOf" srcId="{9A9D5A0B-5696-4692-A878-6377F4B48E0F}" destId="{61058727-6B8E-41F1-9631-03B859BE9760}" srcOrd="0" destOrd="0" presId="urn:microsoft.com/office/officeart/2005/8/layout/hList6"/>
+    <dgm:cxn modelId="{184A5F98-C996-452A-992D-5F4B6CA57C0A}" type="presOf" srcId="{408B3C1A-0D12-4C63-A2E7-15D8F4FCEBA0}" destId="{B4CAADBC-3A4C-43AC-BC0E-C0C2F47C8D8F}" srcOrd="0" destOrd="0" presId="urn:microsoft.com/office/officeart/2005/8/layout/hList6"/>
     <dgm:cxn modelId="{7DE7B21F-07B7-4CEE-B70F-380C343C635D}" srcId="{88EF9924-716E-42E9-AB64-687B0D5F0E27}" destId="{408B3C1A-0D12-4C63-A2E7-15D8F4FCEBA0}" srcOrd="3" destOrd="0" parTransId="{78562F05-CE75-4676-84ED-F0D7EFB7FD63}" sibTransId="{863B1D93-9C21-4B9F-B33E-63325EAFE734}"/>
+    <dgm:cxn modelId="{007171E9-1D23-4447-9478-BB66E7BC6C30}" type="presOf" srcId="{88EF9924-716E-42E9-AB64-687B0D5F0E27}" destId="{692B4974-C617-434A-8776-2F70C6503C51}" srcOrd="0" destOrd="0" presId="urn:microsoft.com/office/officeart/2005/8/layout/hList6"/>
+    <dgm:cxn modelId="{72F9427B-E606-47DC-9C91-E47DD01A7F85}" type="presOf" srcId="{EF20D36D-B52E-4CF1-971B-8898885FF5E8}" destId="{A96E5A5A-E01C-4047-A91D-2A19F32207CC}" srcOrd="0" destOrd="0" presId="urn:microsoft.com/office/officeart/2005/8/layout/hList6"/>
     <dgm:cxn modelId="{4D665D7E-E5AD-4023-9ADA-B48181648234}" type="presOf" srcId="{31DFA831-79CF-43D4-92BE-043E5D1306FD}" destId="{13EE3AD0-0002-4DDD-81A1-35E0F1E19713}" srcOrd="0" destOrd="0" presId="urn:microsoft.com/office/officeart/2005/8/layout/hList6"/>
+    <dgm:cxn modelId="{DA67F082-ADA9-47C1-901A-FEBFA87C4ADC}" srcId="{88EF9924-716E-42E9-AB64-687B0D5F0E27}" destId="{FC47F4CD-37E3-4A69-8C8E-6FED298031AB}" srcOrd="1" destOrd="0" parTransId="{74C6D44E-3C2D-4CC3-A480-760268813022}" sibTransId="{61CF9D07-01F8-48C7-9E28-D9EC59EBE1D5}"/>
     <dgm:cxn modelId="{EC267472-C5C5-4FBE-9AEC-398D3CA18A7E}" type="presOf" srcId="{FC47F4CD-37E3-4A69-8C8E-6FED298031AB}" destId="{3D9FB879-71A3-4867-8E84-F0A4F3CC1359}" srcOrd="0" destOrd="0" presId="urn:microsoft.com/office/officeart/2005/8/layout/hList6"/>
-    <dgm:cxn modelId="{F1534FD1-1A31-4970-B41A-D52E69207035}" type="presOf" srcId="{5A3F655D-86D8-4CAD-A1BB-72CF833D7F2C}" destId="{13831478-F23F-4100-A7E7-DE06624862DD}" srcOrd="0" destOrd="0" presId="urn:microsoft.com/office/officeart/2005/8/layout/hList6"/>
-    <dgm:cxn modelId="{DA67F082-ADA9-47C1-901A-FEBFA87C4ADC}" srcId="{88EF9924-716E-42E9-AB64-687B0D5F0E27}" destId="{FC47F4CD-37E3-4A69-8C8E-6FED298031AB}" srcOrd="1" destOrd="0" parTransId="{74C6D44E-3C2D-4CC3-A480-760268813022}" sibTransId="{61CF9D07-01F8-48C7-9E28-D9EC59EBE1D5}"/>
-    <dgm:cxn modelId="{72F9427B-E606-47DC-9C91-E47DD01A7F85}" type="presOf" srcId="{EF20D36D-B52E-4CF1-971B-8898885FF5E8}" destId="{A96E5A5A-E01C-4047-A91D-2A19F32207CC}" srcOrd="0" destOrd="0" presId="urn:microsoft.com/office/officeart/2005/8/layout/hList6"/>
-    <dgm:cxn modelId="{3EDC4C70-B80B-448D-83B3-83C2D631D441}" srcId="{88EF9924-716E-42E9-AB64-687B0D5F0E27}" destId="{5A3F655D-86D8-4CAD-A1BB-72CF833D7F2C}" srcOrd="2" destOrd="0" parTransId="{B99E623B-9B6F-4BE0-A08F-4E417DDEF87E}" sibTransId="{E58A5292-0E8D-4134-81CD-492CBA8C8AC4}"/>
     <dgm:cxn modelId="{814F0F62-1339-4920-B36B-323AD6046FA2}" srcId="{88EF9924-716E-42E9-AB64-687B0D5F0E27}" destId="{9A9D5A0B-5696-4692-A878-6377F4B48E0F}" srcOrd="4" destOrd="0" parTransId="{022FA54A-605C-43C6-AA65-F23AD18215C2}" sibTransId="{238B5600-741D-458F-810B-5A71A32345B9}"/>
-    <dgm:cxn modelId="{184A5F98-C996-452A-992D-5F4B6CA57C0A}" type="presOf" srcId="{408B3C1A-0D12-4C63-A2E7-15D8F4FCEBA0}" destId="{B4CAADBC-3A4C-43AC-BC0E-C0C2F47C8D8F}" srcOrd="0" destOrd="0" presId="urn:microsoft.com/office/officeart/2005/8/layout/hList6"/>
-    <dgm:cxn modelId="{9ACD5AD3-AA0A-44E3-9F01-4779FB2212DC}" srcId="{88EF9924-716E-42E9-AB64-687B0D5F0E27}" destId="{EF20D36D-B52E-4CF1-971B-8898885FF5E8}" srcOrd="5" destOrd="0" parTransId="{F5823B95-3220-40EB-9DEB-26C374075715}" sibTransId="{E4FDB41E-761F-4CFC-A81B-8F237A38A65B}"/>
-    <dgm:cxn modelId="{007171E9-1D23-4447-9478-BB66E7BC6C30}" type="presOf" srcId="{88EF9924-716E-42E9-AB64-687B0D5F0E27}" destId="{692B4974-C617-434A-8776-2F70C6503C51}" srcOrd="0" destOrd="0" presId="urn:microsoft.com/office/officeart/2005/8/layout/hList6"/>
-    <dgm:cxn modelId="{68FAED8C-6741-4353-AA0A-F3D25919AD33}" srcId="{88EF9924-716E-42E9-AB64-687B0D5F0E27}" destId="{31DFA831-79CF-43D4-92BE-043E5D1306FD}" srcOrd="0" destOrd="0" parTransId="{751DE861-30E9-413B-B750-4FCEF6CAEDD4}" sibTransId="{B2D062BE-BB05-4733-8C3F-10C333BFFCD8}"/>
     <dgm:cxn modelId="{CE631BB9-76E1-4147-8C3C-78C27834A0F6}" type="presParOf" srcId="{692B4974-C617-434A-8776-2F70C6503C51}" destId="{13EE3AD0-0002-4DDD-81A1-35E0F1E19713}" srcOrd="0" destOrd="0" presId="urn:microsoft.com/office/officeart/2005/8/layout/hList6"/>
     <dgm:cxn modelId="{702017B9-54FA-475D-A612-1B204F42DD07}" type="presParOf" srcId="{692B4974-C617-434A-8776-2F70C6503C51}" destId="{C48B6298-C863-4E87-8FA4-0913B94604A3}" srcOrd="1" destOrd="0" presId="urn:microsoft.com/office/officeart/2005/8/layout/hList6"/>
     <dgm:cxn modelId="{F9E0157A-07E4-4383-914E-1FEA355CEF97}" type="presParOf" srcId="{692B4974-C617-434A-8776-2F70C6503C51}" destId="{3D9FB879-71A3-4867-8E84-F0A4F3CC1359}" srcOrd="2" destOrd="0" presId="urn:microsoft.com/office/officeart/2005/8/layout/hList6"/>
@@ -5813,7 +5823,7 @@
         <a:p>
           <a:r>
             <a:rPr lang="en-US" dirty="0" smtClean="0"/>
-            <a:t>SAX</a:t>
+            <a:t>SAX API</a:t>
           </a:r>
           <a:endParaRPr lang="en-US" dirty="0"/>
         </a:p>
@@ -6829,8 +6839,8 @@
       </dsp:nvSpPr>
       <dsp:spPr>
         <a:xfrm>
-          <a:off x="3322" y="1297557"/>
-          <a:ext cx="1677295" cy="1730076"/>
+          <a:off x="949" y="1297557"/>
+          <a:ext cx="1671164" cy="1730076"/>
         </a:xfrm>
         <a:prstGeom prst="roundRect">
           <a:avLst/>
@@ -6871,12 +6881,12 @@
         </a:fontRef>
       </dsp:style>
       <dsp:txBody>
-        <a:bodyPr spcFirstLastPara="0" vert="horz" wrap="square" lIns="72390" tIns="72390" rIns="72390" bIns="72390" numCol="1" spcCol="1270" anchor="ctr" anchorCtr="0">
+        <a:bodyPr spcFirstLastPara="0" vert="horz" wrap="square" lIns="68580" tIns="68580" rIns="68580" bIns="68580" numCol="1" spcCol="1270" anchor="ctr" anchorCtr="0">
           <a:noAutofit/>
         </a:bodyPr>
         <a:lstStyle/>
         <a:p>
-          <a:pPr lvl="0" algn="ctr" defTabSz="844550">
+          <a:pPr lvl="0" algn="ctr" defTabSz="800100">
             <a:lnSpc>
               <a:spcPct val="90000"/>
             </a:lnSpc>
@@ -6888,15 +6898,15 @@
             </a:spcAft>
           </a:pPr>
           <a:r>
-            <a:rPr lang="en-US" sz="1900" kern="1200" dirty="0" smtClean="0"/>
+            <a:rPr lang="en-US" sz="1800" kern="1200" dirty="0" smtClean="0"/>
             <a:t>Fragment</a:t>
           </a:r>
-          <a:endParaRPr lang="en-US" sz="1900" kern="1200" dirty="0"/>
+          <a:endParaRPr lang="en-US" sz="1800" kern="1200" dirty="0"/>
         </a:p>
       </dsp:txBody>
       <dsp:txXfrm>
-        <a:off x="85201" y="1379436"/>
-        <a:ext cx="1513537" cy="1566318"/>
+        <a:off x="82529" y="1379137"/>
+        <a:ext cx="1508004" cy="1566916"/>
       </dsp:txXfrm>
     </dsp:sp>
     <dsp:sp modelId="{E1D526AF-EECB-417C-BB55-56ED15008058}">
@@ -6906,8 +6916,8 @@
       </dsp:nvSpPr>
       <dsp:spPr>
         <a:xfrm>
-          <a:off x="1766358" y="1297557"/>
-          <a:ext cx="1677295" cy="1730076"/>
+          <a:off x="1766704" y="1297557"/>
+          <a:ext cx="1671164" cy="1730076"/>
         </a:xfrm>
         <a:prstGeom prst="roundRect">
           <a:avLst/>
@@ -6948,12 +6958,12 @@
         </a:fontRef>
       </dsp:style>
       <dsp:txBody>
-        <a:bodyPr spcFirstLastPara="0" vert="horz" wrap="square" lIns="72390" tIns="72390" rIns="72390" bIns="72390" numCol="1" spcCol="1270" anchor="ctr" anchorCtr="0">
+        <a:bodyPr spcFirstLastPara="0" vert="horz" wrap="square" lIns="68580" tIns="68580" rIns="68580" bIns="68580" numCol="1" spcCol="1270" anchor="ctr" anchorCtr="0">
           <a:noAutofit/>
         </a:bodyPr>
         <a:lstStyle/>
         <a:p>
-          <a:pPr lvl="0" algn="ctr" defTabSz="844550">
+          <a:pPr lvl="0" algn="ctr" defTabSz="800100">
             <a:lnSpc>
               <a:spcPct val="90000"/>
             </a:lnSpc>
@@ -6965,15 +6975,15 @@
             </a:spcAft>
           </a:pPr>
           <a:r>
-            <a:rPr lang="en-US" sz="1900" kern="1200" dirty="0" err="1" smtClean="0"/>
+            <a:rPr lang="en-US" sz="1800" kern="1200" dirty="0" err="1" smtClean="0"/>
             <a:t>ListView</a:t>
           </a:r>
-          <a:endParaRPr lang="en-US" sz="1900" kern="1200" dirty="0"/>
+          <a:endParaRPr lang="en-US" sz="1800" kern="1200" dirty="0"/>
         </a:p>
       </dsp:txBody>
       <dsp:txXfrm>
-        <a:off x="1848237" y="1379436"/>
-        <a:ext cx="1513537" cy="1566318"/>
+        <a:off x="1848284" y="1379137"/>
+        <a:ext cx="1508004" cy="1566916"/>
       </dsp:txXfrm>
     </dsp:sp>
     <dsp:sp modelId="{0284ECC5-196A-4296-8765-FA8E495CE837}">
@@ -6983,8 +6993,8 @@
       </dsp:nvSpPr>
       <dsp:spPr>
         <a:xfrm>
-          <a:off x="3529394" y="1297557"/>
-          <a:ext cx="1677295" cy="1730076"/>
+          <a:off x="3532459" y="1297557"/>
+          <a:ext cx="1671164" cy="1730076"/>
         </a:xfrm>
         <a:prstGeom prst="roundRect">
           <a:avLst/>
@@ -7025,12 +7035,12 @@
         </a:fontRef>
       </dsp:style>
       <dsp:txBody>
-        <a:bodyPr spcFirstLastPara="0" vert="horz" wrap="square" lIns="72390" tIns="72390" rIns="72390" bIns="72390" numCol="1" spcCol="1270" anchor="ctr" anchorCtr="0">
+        <a:bodyPr spcFirstLastPara="0" vert="horz" wrap="square" lIns="68580" tIns="68580" rIns="68580" bIns="68580" numCol="1" spcCol="1270" anchor="ctr" anchorCtr="0">
           <a:noAutofit/>
         </a:bodyPr>
         <a:lstStyle/>
         <a:p>
-          <a:pPr lvl="0" algn="ctr" defTabSz="844550">
+          <a:pPr lvl="0" algn="ctr" defTabSz="800100">
             <a:lnSpc>
               <a:spcPct val="90000"/>
             </a:lnSpc>
@@ -7042,15 +7052,15 @@
             </a:spcAft>
           </a:pPr>
           <a:r>
-            <a:rPr lang="en-US" sz="1900" kern="1200" dirty="0" err="1" smtClean="0"/>
+            <a:rPr lang="en-US" sz="1800" kern="1200" dirty="0" err="1" smtClean="0"/>
             <a:t>ArrayAdapter</a:t>
           </a:r>
-          <a:endParaRPr lang="en-US" sz="1900" kern="1200" dirty="0"/>
+          <a:endParaRPr lang="en-US" sz="1800" kern="1200" dirty="0"/>
         </a:p>
       </dsp:txBody>
       <dsp:txXfrm>
-        <a:off x="3611273" y="1379436"/>
-        <a:ext cx="1513537" cy="1566318"/>
+        <a:off x="3614039" y="1379137"/>
+        <a:ext cx="1508004" cy="1566916"/>
       </dsp:txXfrm>
     </dsp:sp>
     <dsp:sp modelId="{353CC709-59C8-48AE-BC00-B1492ED75DD0}">
@@ -7060,8 +7070,8 @@
       </dsp:nvSpPr>
       <dsp:spPr>
         <a:xfrm>
-          <a:off x="5292429" y="1297557"/>
-          <a:ext cx="1677295" cy="1730076"/>
+          <a:off x="5298215" y="1297557"/>
+          <a:ext cx="1671164" cy="1730076"/>
         </a:xfrm>
         <a:prstGeom prst="roundRect">
           <a:avLst/>
@@ -7102,12 +7112,12 @@
         </a:fontRef>
       </dsp:style>
       <dsp:txBody>
-        <a:bodyPr spcFirstLastPara="0" vert="horz" wrap="square" lIns="72390" tIns="72390" rIns="72390" bIns="72390" numCol="1" spcCol="1270" anchor="ctr" anchorCtr="0">
+        <a:bodyPr spcFirstLastPara="0" vert="horz" wrap="square" lIns="68580" tIns="68580" rIns="68580" bIns="68580" numCol="1" spcCol="1270" anchor="ctr" anchorCtr="0">
           <a:noAutofit/>
         </a:bodyPr>
         <a:lstStyle/>
         <a:p>
-          <a:pPr lvl="0" algn="ctr" defTabSz="844550">
+          <a:pPr lvl="0" algn="ctr" defTabSz="800100">
             <a:lnSpc>
               <a:spcPct val="90000"/>
             </a:lnSpc>
@@ -7119,15 +7129,36 @@
             </a:spcAft>
           </a:pPr>
           <a:r>
-            <a:rPr lang="en-US" sz="1900" kern="1200" dirty="0" smtClean="0"/>
-            <a:t>Parse XML in Android</a:t>
+            <a:rPr lang="en-US" sz="1800" kern="1200" dirty="0" smtClean="0"/>
+            <a:t>Parse XML in </a:t>
           </a:r>
-          <a:endParaRPr lang="en-US" sz="1900" kern="1200" dirty="0"/>
+          <a:r>
+            <a:rPr lang="en-US" sz="1800" kern="1200" dirty="0" smtClean="0"/>
+            <a:t>Android</a:t>
+          </a:r>
+        </a:p>
+        <a:p>
+          <a:pPr lvl="0" algn="ctr" defTabSz="800100">
+            <a:lnSpc>
+              <a:spcPct val="90000"/>
+            </a:lnSpc>
+            <a:spcBef>
+              <a:spcPct val="0"/>
+            </a:spcBef>
+            <a:spcAft>
+              <a:spcPct val="35000"/>
+            </a:spcAft>
+          </a:pPr>
+          <a:r>
+            <a:rPr lang="en-US" sz="1800" kern="1200" dirty="0" smtClean="0"/>
+            <a:t>SAX API</a:t>
+          </a:r>
+          <a:endParaRPr lang="en-US" sz="1800" kern="1200" dirty="0"/>
         </a:p>
       </dsp:txBody>
       <dsp:txXfrm>
-        <a:off x="5374308" y="1379436"/>
-        <a:ext cx="1513537" cy="1566318"/>
+        <a:off x="5379795" y="1379137"/>
+        <a:ext cx="1508004" cy="1566916"/>
       </dsp:txXfrm>
     </dsp:sp>
     <dsp:sp modelId="{291F90ED-38E8-4CB3-BAE6-AD011092CA61}">
@@ -7137,8 +7168,8 @@
       </dsp:nvSpPr>
       <dsp:spPr>
         <a:xfrm>
-          <a:off x="7055465" y="1297557"/>
-          <a:ext cx="1677295" cy="1730076"/>
+          <a:off x="7063970" y="1297557"/>
+          <a:ext cx="1671164" cy="1730076"/>
         </a:xfrm>
         <a:prstGeom prst="roundRect">
           <a:avLst/>
@@ -7179,12 +7210,12 @@
         </a:fontRef>
       </dsp:style>
       <dsp:txBody>
-        <a:bodyPr spcFirstLastPara="0" vert="horz" wrap="square" lIns="72390" tIns="72390" rIns="72390" bIns="72390" numCol="1" spcCol="1270" anchor="ctr" anchorCtr="0">
+        <a:bodyPr spcFirstLastPara="0" vert="horz" wrap="square" lIns="68580" tIns="68580" rIns="68580" bIns="68580" numCol="1" spcCol="1270" anchor="ctr" anchorCtr="0">
           <a:noAutofit/>
         </a:bodyPr>
         <a:lstStyle/>
         <a:p>
-          <a:pPr lvl="0" algn="ctr" defTabSz="844550">
+          <a:pPr lvl="0" algn="ctr" defTabSz="800100">
             <a:lnSpc>
               <a:spcPct val="90000"/>
             </a:lnSpc>
@@ -7196,19 +7227,19 @@
             </a:spcAft>
           </a:pPr>
           <a:r>
-            <a:rPr lang="en-US" sz="1900" kern="1200" dirty="0" err="1" smtClean="0"/>
+            <a:rPr lang="en-US" sz="1800" kern="1200" dirty="0" err="1" smtClean="0"/>
             <a:t>AsyncTask</a:t>
           </a:r>
           <a:r>
-            <a:rPr lang="en-US" sz="1900" kern="1200" dirty="0" smtClean="0"/>
+            <a:rPr lang="en-US" sz="1800" kern="1200" dirty="0" smtClean="0"/>
             <a:t> HTTP Request</a:t>
           </a:r>
-          <a:endParaRPr lang="en-US" sz="1900" kern="1200" dirty="0"/>
+          <a:endParaRPr lang="en-US" sz="1800" kern="1200" dirty="0"/>
         </a:p>
       </dsp:txBody>
       <dsp:txXfrm>
-        <a:off x="7137344" y="1379436"/>
-        <a:ext cx="1513537" cy="1566318"/>
+        <a:off x="7145550" y="1379137"/>
+        <a:ext cx="1508004" cy="1566916"/>
       </dsp:txXfrm>
     </dsp:sp>
   </dsp:spTree>
@@ -7937,7 +7968,7 @@
           </a:pPr>
           <a:r>
             <a:rPr lang="en-US" sz="3200" kern="1200" dirty="0" smtClean="0"/>
-            <a:t>SAX</a:t>
+            <a:t>SAX API</a:t>
           </a:r>
           <a:endParaRPr lang="en-US" sz="3200" kern="1200" dirty="0"/>
         </a:p>
@@ -22104,7 +22135,7 @@
           <p:nvPr>
             <p:extLst>
               <p:ext uri="{D42A27DB-BD31-4B8C-83A1-F6EECF244321}">
-                <p14:modId xmlns:p14="http://schemas.microsoft.com/office/powerpoint/2010/main" val="1555135674"/>
+                <p14:modId xmlns:p14="http://schemas.microsoft.com/office/powerpoint/2010/main" val="1679895436"/>
               </p:ext>
             </p:extLst>
           </p:nvPr>
@@ -22948,23 +22979,7 @@
             </a:pPr>
             <a:r>
               <a:rPr lang="en-US" sz="2400" cap="none" dirty="0" smtClean="0"/>
-              <a:t>Our goal is to provide an </a:t>
-            </a:r>
-            <a:r>
-              <a:rPr lang="en-US" sz="2400" cap="none" dirty="0" smtClean="0"/>
-              <a:t>easy </a:t>
-            </a:r>
-            <a:r>
-              <a:rPr lang="en-US" sz="2400" cap="none" dirty="0" smtClean="0"/>
-              <a:t>way to read </a:t>
-            </a:r>
-            <a:r>
-              <a:rPr lang="en-US" sz="2400" cap="none" dirty="0" smtClean="0"/>
-              <a:t>RSS feed through </a:t>
-            </a:r>
-            <a:r>
-              <a:rPr lang="en-US" sz="2400" cap="none" dirty="0" smtClean="0"/>
-              <a:t>a mobile device with clear and nice view of layout on it.</a:t>
+              <a:t>Our goal is to provide an easy way to read RSS feed through a mobile device with clear and nice view of layout on it.</a:t>
             </a:r>
           </a:p>
           <a:p>
@@ -23316,7 +23331,7 @@
           <p:nvPr>
             <p:extLst>
               <p:ext uri="{D42A27DB-BD31-4B8C-83A1-F6EECF244321}">
-                <p14:modId xmlns:p14="http://schemas.microsoft.com/office/powerpoint/2010/main" val="100909552"/>
+                <p14:modId xmlns:p14="http://schemas.microsoft.com/office/powerpoint/2010/main" val="552910253"/>
               </p:ext>
             </p:extLst>
           </p:nvPr>

</xml_diff>